<commit_message>
PPT and json changes“
</commit_message>
<xml_diff>
--- a/PostCSS.pptx
+++ b/PostCSS.pptx
@@ -10,10 +10,10 @@
   <p:sldIdLst>
     <p:sldId id="256" r:id="rId2"/>
     <p:sldId id="257" r:id="rId3"/>
-    <p:sldId id="260" r:id="rId4"/>
-    <p:sldId id="258" r:id="rId5"/>
-    <p:sldId id="259" r:id="rId6"/>
-    <p:sldId id="261" r:id="rId7"/>
+    <p:sldId id="258" r:id="rId4"/>
+    <p:sldId id="259" r:id="rId5"/>
+    <p:sldId id="261" r:id="rId6"/>
+    <p:sldId id="260" r:id="rId7"/>
     <p:sldId id="262" r:id="rId8"/>
   </p:sldIdLst>
   <p:sldSz cx="9144000" cy="5143500" type="screen16x9"/>
@@ -115,7 +115,7 @@
   </p:defaultTextStyle>
   <p:extLst>
     <p:ext uri="{EFAFB233-063F-42B5-8137-9DF3F51BA10A}">
-      <p15:sldGuideLst xmlns:p15="http://schemas.microsoft.com/office/powerpoint/2012/main" xmlns="">
+      <p15:sldGuideLst xmlns="" xmlns:p15="http://schemas.microsoft.com/office/powerpoint/2012/main">
         <p15:guide id="1" orient="horz" pos="1620">
           <p15:clr>
             <a:srgbClr val="A4A3A4"/>
@@ -258,11 +258,11 @@
           <c:showBubbleSize val="0"/>
         </c:dLbls>
         <c:gapWidth val="182"/>
-        <c:axId val="2087551720"/>
-        <c:axId val="2087555384"/>
+        <c:axId val="2053648936"/>
+        <c:axId val="2053652600"/>
       </c:barChart>
       <c:catAx>
-        <c:axId val="2087551720"/>
+        <c:axId val="2053648936"/>
         <c:scaling>
           <c:orientation val="maxMin"/>
         </c:scaling>
@@ -297,7 +297,7 @@
             <a:endParaRPr lang="en-US"/>
           </a:p>
         </c:txPr>
-        <c:crossAx val="2087555384"/>
+        <c:crossAx val="2053652600"/>
         <c:crosses val="autoZero"/>
         <c:auto val="1"/>
         <c:lblAlgn val="ctr"/>
@@ -305,7 +305,7 @@
         <c:noMultiLvlLbl val="0"/>
       </c:catAx>
       <c:valAx>
-        <c:axId val="2087555384"/>
+        <c:axId val="2053652600"/>
         <c:scaling>
           <c:orientation val="minMax"/>
         </c:scaling>
@@ -315,7 +315,7 @@
         <c:majorTickMark val="none"/>
         <c:minorTickMark val="none"/>
         <c:tickLblPos val="nextTo"/>
-        <c:crossAx val="2087551720"/>
+        <c:crossAx val="2053648936"/>
         <c:crosses val="autoZero"/>
         <c:crossBetween val="between"/>
       </c:valAx>
@@ -981,7 +981,7 @@
           <a:p>
             <a:fld id="{12F3DFAC-2CAA-464E-91A0-2BBEFEA0B668}" type="datetimeFigureOut">
               <a:rPr lang="en-US" smtClean="0"/>
-              <a:t>21/08/15</a:t>
+              <a:t>22/08/15</a:t>
             </a:fld>
             <a:endParaRPr lang="en-US"/>
           </a:p>
@@ -1418,7 +1418,7 @@
           <a:p>
             <a:fld id="{9BE8D5DA-E8A3-4A98-9BB8-9BE5526C08D6}" type="slidenum">
               <a:rPr lang="en-US" smtClean="0"/>
-              <a:t>3</a:t>
+              <a:t>6</a:t>
             </a:fld>
             <a:endParaRPr lang="en-US"/>
           </a:p>
@@ -1578,6 +1578,18 @@
   <p:clrMapOvr>
     <a:masterClrMapping/>
   </p:clrMapOvr>
+  <mc:AlternateContent xmlns:mc="http://schemas.openxmlformats.org/markup-compatibility/2006">
+    <mc:Choice xmlns:p14="http://schemas.microsoft.com/office/powerpoint/2010/main" Requires="p14">
+      <p:transition spd="med" p14:dur="700">
+        <p:fade/>
+      </p:transition>
+    </mc:Choice>
+    <mc:Fallback>
+      <p:transition xmlns:p14="http://schemas.microsoft.com/office/powerpoint/2010/main" spd="med">
+        <p:fade/>
+      </p:transition>
+    </mc:Fallback>
+  </mc:AlternateContent>
   <p:timing>
     <p:tnLst>
       <p:par>
@@ -1615,6 +1627,18 @@
   <p:clrMapOvr>
     <a:masterClrMapping/>
   </p:clrMapOvr>
+  <mc:AlternateContent xmlns:mc="http://schemas.openxmlformats.org/markup-compatibility/2006">
+    <mc:Choice xmlns:p14="http://schemas.microsoft.com/office/powerpoint/2010/main" Requires="p14">
+      <p:transition spd="med" p14:dur="700">
+        <p:fade/>
+      </p:transition>
+    </mc:Choice>
+    <mc:Fallback>
+      <p:transition xmlns:p14="http://schemas.microsoft.com/office/powerpoint/2010/main" spd="med">
+        <p:fade/>
+      </p:transition>
+    </mc:Fallback>
+  </mc:AlternateContent>
   <p:timing>
     <p:tnLst>
       <p:par>
@@ -1818,6 +1842,18 @@
   <p:clrMapOvr>
     <a:masterClrMapping/>
   </p:clrMapOvr>
+  <mc:AlternateContent xmlns:mc="http://schemas.openxmlformats.org/markup-compatibility/2006">
+    <mc:Choice xmlns:p14="http://schemas.microsoft.com/office/powerpoint/2010/main" Requires="p14">
+      <p:transition spd="med" p14:dur="700">
+        <p:fade/>
+      </p:transition>
+    </mc:Choice>
+    <mc:Fallback>
+      <p:transition xmlns:p14="http://schemas.microsoft.com/office/powerpoint/2010/main" spd="med">
+        <p:fade/>
+      </p:transition>
+    </mc:Fallback>
+  </mc:AlternateContent>
   <p:timing>
     <p:tnLst>
       <p:par>
@@ -2086,6 +2122,18 @@
   <p:clrMapOvr>
     <a:masterClrMapping/>
   </p:clrMapOvr>
+  <mc:AlternateContent xmlns:mc="http://schemas.openxmlformats.org/markup-compatibility/2006">
+    <mc:Choice xmlns:p14="http://schemas.microsoft.com/office/powerpoint/2010/main" Requires="p14">
+      <p:transition spd="med" p14:dur="700">
+        <p:fade/>
+      </p:transition>
+    </mc:Choice>
+    <mc:Fallback>
+      <p:transition xmlns:p14="http://schemas.microsoft.com/office/powerpoint/2010/main" spd="med">
+        <p:fade/>
+      </p:transition>
+    </mc:Fallback>
+  </mc:AlternateContent>
   <p:timing>
     <p:tnLst>
       <p:par>
@@ -2146,6 +2194,18 @@
   <p:clrMapOvr>
     <a:masterClrMapping/>
   </p:clrMapOvr>
+  <mc:AlternateContent xmlns:mc="http://schemas.openxmlformats.org/markup-compatibility/2006">
+    <mc:Choice xmlns:p14="http://schemas.microsoft.com/office/powerpoint/2010/main" Requires="p14">
+      <p:transition spd="med" p14:dur="700">
+        <p:fade/>
+      </p:transition>
+    </mc:Choice>
+    <mc:Fallback>
+      <p:transition xmlns:p14="http://schemas.microsoft.com/office/powerpoint/2010/main" spd="med">
+        <p:fade/>
+      </p:transition>
+    </mc:Fallback>
+  </mc:AlternateContent>
   <p:timing>
     <p:tnLst>
       <p:par>
@@ -2310,6 +2370,18 @@
   <p:clrMapOvr>
     <a:masterClrMapping/>
   </p:clrMapOvr>
+  <mc:AlternateContent xmlns:mc="http://schemas.openxmlformats.org/markup-compatibility/2006">
+    <mc:Choice xmlns:p14="http://schemas.microsoft.com/office/powerpoint/2010/main" Requires="p14">
+      <p:transition spd="med" p14:dur="700">
+        <p:fade/>
+      </p:transition>
+    </mc:Choice>
+    <mc:Fallback>
+      <p:transition xmlns:p14="http://schemas.microsoft.com/office/powerpoint/2010/main" spd="med">
+        <p:fade/>
+      </p:transition>
+    </mc:Fallback>
+  </mc:AlternateContent>
   <p:timing>
     <p:tnLst>
       <p:par>
@@ -2551,6 +2623,18 @@
   <p:clrMapOvr>
     <a:masterClrMapping/>
   </p:clrMapOvr>
+  <mc:AlternateContent xmlns:mc="http://schemas.openxmlformats.org/markup-compatibility/2006">
+    <mc:Choice xmlns:p14="http://schemas.microsoft.com/office/powerpoint/2010/main" Requires="p14">
+      <p:transition spd="med" p14:dur="700">
+        <p:fade/>
+      </p:transition>
+    </mc:Choice>
+    <mc:Fallback>
+      <p:transition xmlns:p14="http://schemas.microsoft.com/office/powerpoint/2010/main" spd="med">
+        <p:fade/>
+      </p:transition>
+    </mc:Fallback>
+  </mc:AlternateContent>
   <p:timing>
     <p:tnLst>
       <p:par>
@@ -2693,6 +2777,18 @@
   <p:clrMapOvr>
     <a:masterClrMapping/>
   </p:clrMapOvr>
+  <mc:AlternateContent xmlns:mc="http://schemas.openxmlformats.org/markup-compatibility/2006">
+    <mc:Choice xmlns:p14="http://schemas.microsoft.com/office/powerpoint/2010/main" Requires="p14">
+      <p:transition spd="med" p14:dur="700">
+        <p:fade/>
+      </p:transition>
+    </mc:Choice>
+    <mc:Fallback>
+      <p:transition xmlns:p14="http://schemas.microsoft.com/office/powerpoint/2010/main" spd="med">
+        <p:fade/>
+      </p:transition>
+    </mc:Fallback>
+  </mc:AlternateContent>
   <p:timing>
     <p:tnLst>
       <p:par>
@@ -2928,6 +3024,18 @@
   <p:clrMapOvr>
     <a:masterClrMapping/>
   </p:clrMapOvr>
+  <mc:AlternateContent xmlns:mc="http://schemas.openxmlformats.org/markup-compatibility/2006">
+    <mc:Choice xmlns:p14="http://schemas.microsoft.com/office/powerpoint/2010/main" Requires="p14">
+      <p:transition spd="med" p14:dur="700">
+        <p:fade/>
+      </p:transition>
+    </mc:Choice>
+    <mc:Fallback>
+      <p:transition xmlns:p14="http://schemas.microsoft.com/office/powerpoint/2010/main" spd="med">
+        <p:fade/>
+      </p:transition>
+    </mc:Fallback>
+  </mc:AlternateContent>
   <p:timing>
     <p:tnLst>
       <p:par>
@@ -3179,6 +3287,18 @@
   <p:clrMapOvr>
     <a:masterClrMapping/>
   </p:clrMapOvr>
+  <mc:AlternateContent xmlns:mc="http://schemas.openxmlformats.org/markup-compatibility/2006">
+    <mc:Choice xmlns:p14="http://schemas.microsoft.com/office/powerpoint/2010/main" Requires="p14">
+      <p:transition spd="med" p14:dur="700">
+        <p:fade/>
+      </p:transition>
+    </mc:Choice>
+    <mc:Fallback>
+      <p:transition xmlns:p14="http://schemas.microsoft.com/office/powerpoint/2010/main" spd="med">
+        <p:fade/>
+      </p:transition>
+    </mc:Fallback>
+  </mc:AlternateContent>
   <p:timing>
     <p:tnLst>
       <p:par>
@@ -3571,6 +3691,18 @@
   <p:clrMapOvr>
     <a:masterClrMapping/>
   </p:clrMapOvr>
+  <mc:AlternateContent xmlns:mc="http://schemas.openxmlformats.org/markup-compatibility/2006">
+    <mc:Choice xmlns:p14="http://schemas.microsoft.com/office/powerpoint/2010/main" Requires="p14">
+      <p:transition spd="med" p14:dur="700">
+        <p:fade/>
+      </p:transition>
+    </mc:Choice>
+    <mc:Fallback>
+      <p:transition xmlns:p14="http://schemas.microsoft.com/office/powerpoint/2010/main" spd="med">
+        <p:fade/>
+      </p:transition>
+    </mc:Fallback>
+  </mc:AlternateContent>
   <p:timing>
     <p:tnLst>
       <p:par>
@@ -3799,6 +3931,18 @@
     <p:sldLayoutId id="2147483655" r:id="rId10"/>
     <p:sldLayoutId id="2147483657" r:id="rId11"/>
   </p:sldLayoutIdLst>
+  <mc:AlternateContent xmlns:mc="http://schemas.openxmlformats.org/markup-compatibility/2006">
+    <mc:Choice xmlns:p14="http://schemas.microsoft.com/office/powerpoint/2010/main" Requires="p14">
+      <p:transition spd="med" p14:dur="700">
+        <p:fade/>
+      </p:transition>
+    </mc:Choice>
+    <mc:Fallback>
+      <p:transition xmlns:p14="http://schemas.microsoft.com/office/powerpoint/2010/main" spd="med">
+        <p:fade/>
+      </p:transition>
+    </mc:Fallback>
+  </mc:AlternateContent>
   <p:timing>
     <p:tnLst>
       <p:par>
@@ -4269,6 +4413,18 @@
   <p:clrMapOvr>
     <a:masterClrMapping/>
   </p:clrMapOvr>
+  <mc:AlternateContent xmlns:mc="http://schemas.openxmlformats.org/markup-compatibility/2006">
+    <mc:Choice xmlns:p14="http://schemas.microsoft.com/office/powerpoint/2010/main" Requires="p14">
+      <p:transition spd="med" p14:dur="700">
+        <p:fade/>
+      </p:transition>
+    </mc:Choice>
+    <mc:Fallback>
+      <p:transition xmlns:p14="http://schemas.microsoft.com/office/powerpoint/2010/main" spd="med">
+        <p:fade/>
+      </p:transition>
+    </mc:Fallback>
+  </mc:AlternateContent>
   <p:timing>
     <p:tnLst>
       <p:par>
@@ -4351,6 +4507,10 @@
           </a:bodyPr>
           <a:lstStyle/>
           <a:p>
+            <a:pPr marL="457200" indent="-457200">
+              <a:buFont typeface="Arial"/>
+              <a:buChar char="•"/>
+            </a:pPr>
             <a:r>
               <a:rPr lang="en-US" dirty="0" err="1"/>
               <a:t>PostCSS</a:t>
@@ -4365,11 +4525,7 @@
             </a:r>
             <a:r>
               <a:rPr lang="hr-HR" dirty="0" smtClean="0"/>
-              <a:t> </a:t>
-            </a:r>
-            <a:r>
-              <a:rPr lang="hr-HR" dirty="0" smtClean="0"/>
-              <a:t>a</a:t>
+              <a:t> a</a:t>
             </a:r>
             <a:r>
               <a:rPr lang="ta-IN" dirty="0" smtClean="0"/>
@@ -4389,6 +4545,10 @@
             </a:r>
           </a:p>
           <a:p>
+            <a:pPr marL="457200" indent="-457200">
+              <a:buFont typeface="Arial"/>
+              <a:buChar char="•"/>
+            </a:pPr>
             <a:r>
               <a:rPr lang="en-US" dirty="0"/>
               <a:t>These plugins can support variables and </a:t>
@@ -4426,6 +4586,18 @@
   <p:clrMapOvr>
     <a:masterClrMapping/>
   </p:clrMapOvr>
+  <mc:AlternateContent xmlns:mc="http://schemas.openxmlformats.org/markup-compatibility/2006">
+    <mc:Choice xmlns:p14="http://schemas.microsoft.com/office/powerpoint/2010/main" Requires="p14">
+      <p:transition spd="med" p14:dur="700">
+        <p:fade/>
+      </p:transition>
+    </mc:Choice>
+    <mc:Fallback>
+      <p:transition xmlns:p14="http://schemas.microsoft.com/office/powerpoint/2010/main" spd="med">
+        <p:fade/>
+      </p:transition>
+    </mc:Fallback>
+  </mc:AlternateContent>
   <p:timing>
     <p:tnLst>
       <p:par>
@@ -4437,6 +4609,598 @@
 </file>
 
 <file path=ppt/slides/slide3.xml><?xml version="1.0" encoding="utf-8"?>
+<p:sld xmlns:a="http://schemas.openxmlformats.org/drawingml/2006/main" xmlns:r="http://schemas.openxmlformats.org/officeDocument/2006/relationships" xmlns:p="http://schemas.openxmlformats.org/presentationml/2006/main">
+  <p:cSld>
+    <p:spTree>
+      <p:nvGrpSpPr>
+        <p:cNvPr id="1" name=""/>
+        <p:cNvGrpSpPr/>
+        <p:nvPr/>
+      </p:nvGrpSpPr>
+      <p:grpSpPr>
+        <a:xfrm>
+          <a:off x="0" y="0"/>
+          <a:ext cx="0" cy="0"/>
+          <a:chOff x="0" y="0"/>
+          <a:chExt cx="0" cy="0"/>
+        </a:xfrm>
+      </p:grpSpPr>
+      <p:sp>
+        <p:nvSpPr>
+          <p:cNvPr id="2" name="Title 1"/>
+          <p:cNvSpPr>
+            <a:spLocks noGrp="1"/>
+          </p:cNvSpPr>
+          <p:nvPr>
+            <p:ph type="ctrTitle"/>
+          </p:nvPr>
+        </p:nvSpPr>
+        <p:spPr/>
+        <p:txBody>
+          <a:bodyPr/>
+          <a:lstStyle/>
+          <a:p>
+            <a:r>
+              <a:rPr lang="ta-IN" dirty="0" smtClean="0"/>
+              <a:t>Tools</a:t>
+            </a:r>
+            <a:endParaRPr lang="en-US" dirty="0"/>
+          </a:p>
+        </p:txBody>
+      </p:sp>
+      <p:sp>
+        <p:nvSpPr>
+          <p:cNvPr id="3" name="Subtitle 2"/>
+          <p:cNvSpPr>
+            <a:spLocks noGrp="1"/>
+          </p:cNvSpPr>
+          <p:nvPr>
+            <p:ph type="subTitle" idx="1"/>
+          </p:nvPr>
+        </p:nvSpPr>
+        <p:spPr>
+          <a:xfrm>
+            <a:off x="611560" y="1977380"/>
+            <a:ext cx="5832648" cy="2250554"/>
+          </a:xfrm>
+        </p:spPr>
+        <p:txBody>
+          <a:bodyPr>
+            <a:normAutofit/>
+          </a:bodyPr>
+          <a:lstStyle/>
+          <a:p>
+            <a:pPr marL="457200" indent="-457200">
+              <a:buFont typeface="Arial" panose="020B0604020202020204" pitchFamily="34" charset="0"/>
+              <a:buChar char="•"/>
+            </a:pPr>
+            <a:r>
+              <a:rPr lang="en-US" dirty="0" smtClean="0"/>
+              <a:t>Node.js</a:t>
+            </a:r>
+          </a:p>
+          <a:p>
+            <a:pPr marL="457200" indent="-457200">
+              <a:buFont typeface="Arial" panose="020B0604020202020204" pitchFamily="34" charset="0"/>
+              <a:buChar char="•"/>
+            </a:pPr>
+            <a:r>
+              <a:rPr lang="en-US" dirty="0" err="1" smtClean="0"/>
+              <a:t>npm</a:t>
+            </a:r>
+            <a:r>
+              <a:rPr lang="en-US" dirty="0" smtClean="0"/>
+              <a:t> (node package manager)</a:t>
+            </a:r>
+          </a:p>
+          <a:p>
+            <a:pPr marL="457200" indent="-457200">
+              <a:buFont typeface="Arial" panose="020B0604020202020204" pitchFamily="34" charset="0"/>
+              <a:buChar char="•"/>
+            </a:pPr>
+            <a:r>
+              <a:rPr lang="en-US" dirty="0" smtClean="0"/>
+              <a:t>Gulp.js</a:t>
+            </a:r>
+          </a:p>
+          <a:p>
+            <a:pPr marL="457200" indent="-457200">
+              <a:buFont typeface="Arial" panose="020B0604020202020204" pitchFamily="34" charset="0"/>
+              <a:buChar char="•"/>
+            </a:pPr>
+            <a:r>
+              <a:rPr lang="en-US" dirty="0" smtClean="0"/>
+              <a:t>CSS</a:t>
+            </a:r>
+            <a:endParaRPr lang="en-US" dirty="0"/>
+          </a:p>
+        </p:txBody>
+      </p:sp>
+    </p:spTree>
+    <p:extLst>
+      <p:ext uri="{BB962C8B-B14F-4D97-AF65-F5344CB8AC3E}">
+        <p14:creationId xmlns:p14="http://schemas.microsoft.com/office/powerpoint/2010/main" val="3060360801"/>
+      </p:ext>
+    </p:extLst>
+  </p:cSld>
+  <p:clrMapOvr>
+    <a:masterClrMapping/>
+  </p:clrMapOvr>
+  <mc:AlternateContent xmlns:mc="http://schemas.openxmlformats.org/markup-compatibility/2006">
+    <mc:Choice xmlns:p14="http://schemas.microsoft.com/office/powerpoint/2010/main" Requires="p14">
+      <p:transition spd="med" p14:dur="700">
+        <p:fade/>
+      </p:transition>
+    </mc:Choice>
+    <mc:Fallback>
+      <p:transition xmlns:p14="http://schemas.microsoft.com/office/powerpoint/2010/main" spd="med">
+        <p:fade/>
+      </p:transition>
+    </mc:Fallback>
+  </mc:AlternateContent>
+  <p:timing>
+    <p:tnLst>
+      <p:par>
+        <p:cTn xmlns:p14="http://schemas.microsoft.com/office/powerpoint/2010/main" id="1" dur="indefinite" restart="never" nodeType="tmRoot"/>
+      </p:par>
+    </p:tnLst>
+  </p:timing>
+</p:sld>
+</file>
+
+<file path=ppt/slides/slide4.xml><?xml version="1.0" encoding="utf-8"?>
+<p:sld xmlns:a="http://schemas.openxmlformats.org/drawingml/2006/main" xmlns:r="http://schemas.openxmlformats.org/officeDocument/2006/relationships" xmlns:p="http://schemas.openxmlformats.org/presentationml/2006/main">
+  <p:cSld>
+    <p:spTree>
+      <p:nvGrpSpPr>
+        <p:cNvPr id="1" name=""/>
+        <p:cNvGrpSpPr/>
+        <p:nvPr/>
+      </p:nvGrpSpPr>
+      <p:grpSpPr>
+        <a:xfrm>
+          <a:off x="0" y="0"/>
+          <a:ext cx="0" cy="0"/>
+          <a:chOff x="0" y="0"/>
+          <a:chExt cx="0" cy="0"/>
+        </a:xfrm>
+      </p:grpSpPr>
+      <p:sp>
+        <p:nvSpPr>
+          <p:cNvPr id="2" name="Title 1"/>
+          <p:cNvSpPr>
+            <a:spLocks noGrp="1"/>
+          </p:cNvSpPr>
+          <p:nvPr>
+            <p:ph type="ctrTitle"/>
+          </p:nvPr>
+        </p:nvSpPr>
+        <p:spPr/>
+        <p:txBody>
+          <a:bodyPr/>
+          <a:lstStyle/>
+          <a:p>
+            <a:r>
+              <a:rPr lang="en-US" dirty="0" smtClean="0"/>
+              <a:t>Usage</a:t>
+            </a:r>
+            <a:endParaRPr lang="en-US" dirty="0"/>
+          </a:p>
+        </p:txBody>
+      </p:sp>
+      <p:sp>
+        <p:nvSpPr>
+          <p:cNvPr id="3" name="Subtitle 2"/>
+          <p:cNvSpPr>
+            <a:spLocks noGrp="1"/>
+          </p:cNvSpPr>
+          <p:nvPr>
+            <p:ph type="subTitle" idx="1"/>
+          </p:nvPr>
+        </p:nvSpPr>
+        <p:spPr>
+          <a:xfrm>
+            <a:off x="611560" y="1977380"/>
+            <a:ext cx="5832648" cy="2754610"/>
+          </a:xfrm>
+        </p:spPr>
+        <p:txBody>
+          <a:bodyPr>
+            <a:normAutofit/>
+          </a:bodyPr>
+          <a:lstStyle/>
+          <a:p>
+            <a:pPr marL="457200" indent="-457200">
+              <a:buFont typeface="Arial" panose="020B0604020202020204" pitchFamily="34" charset="0"/>
+              <a:buChar char="•"/>
+            </a:pPr>
+            <a:r>
+              <a:rPr lang="en-US" dirty="0"/>
+              <a:t>Add </a:t>
+            </a:r>
+            <a:r>
+              <a:rPr lang="en-US" dirty="0" err="1"/>
+              <a:t>PostCSS</a:t>
+            </a:r>
+            <a:r>
+              <a:rPr lang="en-US" dirty="0"/>
+              <a:t> to your build tool.</a:t>
+            </a:r>
+          </a:p>
+          <a:p>
+            <a:pPr marL="457200" indent="-457200">
+              <a:buFont typeface="Arial" panose="020B0604020202020204" pitchFamily="34" charset="0"/>
+              <a:buChar char="•"/>
+            </a:pPr>
+            <a:r>
+              <a:rPr lang="en-US" dirty="0"/>
+              <a:t>Select plugins </a:t>
+            </a:r>
+            <a:r>
+              <a:rPr lang="en-US" dirty="0" smtClean="0"/>
+              <a:t>and </a:t>
+            </a:r>
+            <a:r>
+              <a:rPr lang="en-US" dirty="0"/>
+              <a:t>add them to your </a:t>
+            </a:r>
+            <a:r>
+              <a:rPr lang="en-US" dirty="0" err="1"/>
+              <a:t>PostCSS</a:t>
+            </a:r>
+            <a:r>
+              <a:rPr lang="en-US" dirty="0"/>
+              <a:t> process.</a:t>
+            </a:r>
+          </a:p>
+          <a:p>
+            <a:pPr marL="457200" indent="-457200">
+              <a:buFont typeface="Arial" panose="020B0604020202020204" pitchFamily="34" charset="0"/>
+              <a:buChar char="•"/>
+            </a:pPr>
+            <a:r>
+              <a:rPr lang="en-US" dirty="0" smtClean="0"/>
+              <a:t>There are plugins for Grunt, Gulp, </a:t>
+            </a:r>
+            <a:r>
+              <a:rPr lang="en-US" dirty="0" err="1" smtClean="0"/>
+              <a:t>webpack</a:t>
+            </a:r>
+            <a:r>
+              <a:rPr lang="en-US" dirty="0" smtClean="0"/>
+              <a:t>, Broccoli, Brunch and ENB.</a:t>
+            </a:r>
+            <a:endParaRPr lang="en-US" dirty="0"/>
+          </a:p>
+        </p:txBody>
+      </p:sp>
+    </p:spTree>
+    <p:extLst>
+      <p:ext uri="{BB962C8B-B14F-4D97-AF65-F5344CB8AC3E}">
+        <p14:creationId xmlns:p14="http://schemas.microsoft.com/office/powerpoint/2010/main" val="216392634"/>
+      </p:ext>
+    </p:extLst>
+  </p:cSld>
+  <p:clrMapOvr>
+    <a:masterClrMapping/>
+  </p:clrMapOvr>
+  <mc:AlternateContent xmlns:mc="http://schemas.openxmlformats.org/markup-compatibility/2006">
+    <mc:Choice xmlns:p14="http://schemas.microsoft.com/office/powerpoint/2010/main" Requires="p14">
+      <p:transition spd="med" p14:dur="700">
+        <p:fade/>
+      </p:transition>
+    </mc:Choice>
+    <mc:Fallback>
+      <p:transition xmlns:p14="http://schemas.microsoft.com/office/powerpoint/2010/main" spd="med">
+        <p:fade/>
+      </p:transition>
+    </mc:Fallback>
+  </mc:AlternateContent>
+  <p:timing>
+    <p:tnLst>
+      <p:par>
+        <p:cTn xmlns:p14="http://schemas.microsoft.com/office/powerpoint/2010/main" id="1" dur="indefinite" restart="never" nodeType="tmRoot"/>
+      </p:par>
+    </p:tnLst>
+  </p:timing>
+</p:sld>
+</file>
+
+<file path=ppt/slides/slide5.xml><?xml version="1.0" encoding="utf-8"?>
+<p:sld xmlns:a="http://schemas.openxmlformats.org/drawingml/2006/main" xmlns:r="http://schemas.openxmlformats.org/officeDocument/2006/relationships" xmlns:p="http://schemas.openxmlformats.org/presentationml/2006/main">
+  <p:cSld>
+    <p:spTree>
+      <p:nvGrpSpPr>
+        <p:cNvPr id="1" name=""/>
+        <p:cNvGrpSpPr/>
+        <p:nvPr/>
+      </p:nvGrpSpPr>
+      <p:grpSpPr>
+        <a:xfrm>
+          <a:off x="0" y="0"/>
+          <a:ext cx="0" cy="0"/>
+          <a:chOff x="0" y="0"/>
+          <a:chExt cx="0" cy="0"/>
+        </a:xfrm>
+      </p:grpSpPr>
+      <p:sp>
+        <p:nvSpPr>
+          <p:cNvPr id="2" name="Title 1"/>
+          <p:cNvSpPr>
+            <a:spLocks noGrp="1"/>
+          </p:cNvSpPr>
+          <p:nvPr>
+            <p:ph type="ctrTitle"/>
+          </p:nvPr>
+        </p:nvSpPr>
+        <p:spPr/>
+        <p:txBody>
+          <a:bodyPr/>
+          <a:lstStyle/>
+          <a:p>
+            <a:r>
+              <a:rPr lang="hr-HR" dirty="0" err="1" smtClean="0"/>
+              <a:t>Plugins</a:t>
+            </a:r>
+            <a:endParaRPr lang="en-US" dirty="0"/>
+          </a:p>
+        </p:txBody>
+      </p:sp>
+      <p:sp>
+        <p:nvSpPr>
+          <p:cNvPr id="3" name="Subtitle 2"/>
+          <p:cNvSpPr>
+            <a:spLocks noGrp="1"/>
+          </p:cNvSpPr>
+          <p:nvPr>
+            <p:ph type="subTitle" idx="1"/>
+          </p:nvPr>
+        </p:nvSpPr>
+        <p:spPr>
+          <a:xfrm>
+            <a:off x="611560" y="1563638"/>
+            <a:ext cx="6192688" cy="3384376"/>
+          </a:xfrm>
+        </p:spPr>
+        <p:txBody>
+          <a:bodyPr>
+            <a:normAutofit fontScale="92500" lnSpcReduction="20000"/>
+          </a:bodyPr>
+          <a:lstStyle/>
+          <a:p>
+            <a:pPr marL="457200" indent="-457200">
+              <a:lnSpc>
+                <a:spcPct val="110000"/>
+              </a:lnSpc>
+              <a:buFont typeface="Arial"/>
+              <a:buChar char="•"/>
+            </a:pPr>
+            <a:r>
+              <a:rPr lang="ta-IN" dirty="0" smtClean="0"/>
+              <a:t>Mixins</a:t>
+            </a:r>
+            <a:r>
+              <a:rPr lang="ta-IN" dirty="0"/>
+              <a:t> – </a:t>
+            </a:r>
+            <a:r>
+              <a:rPr lang="en-US" dirty="0" err="1" smtClean="0"/>
+              <a:t>postcss</a:t>
+            </a:r>
+            <a:r>
+              <a:rPr lang="en-US" dirty="0" err="1"/>
+              <a:t>-mixins</a:t>
+            </a:r>
+            <a:endParaRPr lang="en-US" dirty="0"/>
+          </a:p>
+          <a:p>
+            <a:pPr marL="457200" indent="-457200">
+              <a:lnSpc>
+                <a:spcPct val="110000"/>
+              </a:lnSpc>
+              <a:buFont typeface="Arial"/>
+              <a:buChar char="•"/>
+            </a:pPr>
+            <a:r>
+              <a:rPr lang="ta-IN" dirty="0"/>
+              <a:t>Variables – </a:t>
+            </a:r>
+            <a:r>
+              <a:rPr lang="en-US" dirty="0" err="1"/>
+              <a:t>postcss</a:t>
+            </a:r>
+            <a:r>
+              <a:rPr lang="en-US" dirty="0"/>
+              <a:t>-simple-</a:t>
+            </a:r>
+            <a:r>
+              <a:rPr lang="en-US" dirty="0" err="1"/>
+              <a:t>vars</a:t>
+            </a:r>
+            <a:endParaRPr lang="en-US" dirty="0"/>
+          </a:p>
+          <a:p>
+            <a:pPr marL="457200" indent="-457200">
+              <a:lnSpc>
+                <a:spcPct val="110000"/>
+              </a:lnSpc>
+              <a:buFont typeface="Arial"/>
+              <a:buChar char="•"/>
+            </a:pPr>
+            <a:r>
+              <a:rPr lang="ta-IN" dirty="0" smtClean="0"/>
+              <a:t>Nesting</a:t>
+            </a:r>
+            <a:r>
+              <a:rPr lang="ta-IN" dirty="0"/>
+              <a:t> – </a:t>
+            </a:r>
+            <a:r>
+              <a:rPr lang="en-US" dirty="0" err="1" smtClean="0"/>
+              <a:t>postcss</a:t>
+            </a:r>
+            <a:r>
+              <a:rPr lang="en-US" dirty="0"/>
+              <a:t>-nested</a:t>
+            </a:r>
+          </a:p>
+          <a:p>
+            <a:pPr marL="457200" indent="-457200">
+              <a:lnSpc>
+                <a:spcPct val="110000"/>
+              </a:lnSpc>
+              <a:buFont typeface="Arial"/>
+              <a:buChar char="•"/>
+            </a:pPr>
+            <a:r>
+              <a:rPr lang="ta-IN" dirty="0"/>
+              <a:t>C</a:t>
+            </a:r>
+            <a:r>
+              <a:rPr lang="en-US" dirty="0" err="1"/>
+              <a:t>ustom</a:t>
+            </a:r>
+            <a:r>
+              <a:rPr lang="ta-IN" dirty="0"/>
+              <a:t> </a:t>
+            </a:r>
+            <a:r>
+              <a:rPr lang="en-US" dirty="0"/>
+              <a:t>Media</a:t>
+            </a:r>
+            <a:r>
+              <a:rPr lang="ta-IN" dirty="0"/>
+              <a:t> </a:t>
+            </a:r>
+            <a:r>
+              <a:rPr lang="ta-IN" dirty="0" smtClean="0"/>
+              <a:t>Queries</a:t>
+            </a:r>
+            <a:r>
+              <a:rPr lang="ta-IN" dirty="0"/>
+              <a:t> – </a:t>
+            </a:r>
+            <a:r>
+              <a:rPr lang="en-US" dirty="0" err="1" smtClean="0"/>
+              <a:t>postcss</a:t>
+            </a:r>
+            <a:r>
+              <a:rPr lang="en-US" dirty="0"/>
+              <a:t>-custom-media</a:t>
+            </a:r>
+          </a:p>
+          <a:p>
+            <a:pPr marL="457200" indent="-457200">
+              <a:lnSpc>
+                <a:spcPct val="110000"/>
+              </a:lnSpc>
+              <a:buFont typeface="Arial"/>
+              <a:buChar char="•"/>
+            </a:pPr>
+            <a:r>
+              <a:rPr lang="ta-IN" dirty="0"/>
+              <a:t>Minification – </a:t>
+            </a:r>
+            <a:r>
+              <a:rPr lang="en-US" dirty="0" err="1"/>
+              <a:t>cssnano</a:t>
+            </a:r>
+            <a:endParaRPr lang="en-US" dirty="0"/>
+          </a:p>
+          <a:p>
+            <a:pPr marL="457200" indent="-457200">
+              <a:lnSpc>
+                <a:spcPct val="110000"/>
+              </a:lnSpc>
+              <a:buFont typeface="Arial"/>
+              <a:buChar char="•"/>
+            </a:pPr>
+            <a:r>
+              <a:rPr lang="ta-IN" dirty="0"/>
+              <a:t>Pixels to </a:t>
+            </a:r>
+            <a:r>
+              <a:rPr lang="ta-IN" dirty="0" smtClean="0"/>
+              <a:t>REM</a:t>
+            </a:r>
+            <a:r>
+              <a:rPr lang="ta-IN" dirty="0"/>
+              <a:t> – </a:t>
+            </a:r>
+            <a:r>
+              <a:rPr lang="en-US" dirty="0" err="1" smtClean="0"/>
+              <a:t>postcss</a:t>
+            </a:r>
+            <a:r>
+              <a:rPr lang="en-US" dirty="0" err="1"/>
+              <a:t>-pxtorem</a:t>
+            </a:r>
+            <a:endParaRPr lang="en-US" dirty="0"/>
+          </a:p>
+          <a:p>
+            <a:pPr marL="457200" indent="-457200">
+              <a:lnSpc>
+                <a:spcPct val="110000"/>
+              </a:lnSpc>
+              <a:buFont typeface="Arial"/>
+              <a:buChar char="•"/>
+            </a:pPr>
+            <a:r>
+              <a:rPr lang="ta-IN" dirty="0" smtClean="0"/>
+              <a:t>A</a:t>
+            </a:r>
+            <a:r>
+              <a:rPr lang="en-US" dirty="0" err="1" smtClean="0"/>
+              <a:t>utoprefixer</a:t>
+            </a:r>
+            <a:r>
+              <a:rPr lang="ta-IN" dirty="0"/>
+              <a:t> – </a:t>
+            </a:r>
+            <a:r>
+              <a:rPr lang="en-US" dirty="0" err="1" smtClean="0"/>
+              <a:t>autoprefixer</a:t>
+            </a:r>
+            <a:r>
+              <a:rPr lang="en-US" dirty="0"/>
+              <a:t>-core</a:t>
+            </a:r>
+          </a:p>
+        </p:txBody>
+      </p:sp>
+    </p:spTree>
+    <p:extLst>
+      <p:ext uri="{BB962C8B-B14F-4D97-AF65-F5344CB8AC3E}">
+        <p14:creationId xmlns:p14="http://schemas.microsoft.com/office/powerpoint/2010/main" val="3267037310"/>
+      </p:ext>
+    </p:extLst>
+  </p:cSld>
+  <p:clrMapOvr>
+    <a:masterClrMapping/>
+  </p:clrMapOvr>
+  <mc:AlternateContent xmlns:mc="http://schemas.openxmlformats.org/markup-compatibility/2006">
+    <mc:Choice xmlns:p14="http://schemas.microsoft.com/office/powerpoint/2010/main" Requires="p14">
+      <p:transition spd="med" p14:dur="700">
+        <p:fade/>
+      </p:transition>
+    </mc:Choice>
+    <mc:Fallback>
+      <p:transition xmlns:p14="http://schemas.microsoft.com/office/powerpoint/2010/main" spd="med">
+        <p:fade/>
+      </p:transition>
+    </mc:Fallback>
+  </mc:AlternateContent>
+  <p:timing>
+    <p:tnLst>
+      <p:par>
+        <p:cTn xmlns:p14="http://schemas.microsoft.com/office/powerpoint/2010/main" id="1" dur="indefinite" restart="never" nodeType="tmRoot"/>
+      </p:par>
+    </p:tnLst>
+  </p:timing>
+</p:sld>
+</file>
+
+<file path=ppt/slides/slide6.xml><?xml version="1.0" encoding="utf-8"?>
 <p:sld xmlns:a="http://schemas.openxmlformats.org/drawingml/2006/main" xmlns:r="http://schemas.openxmlformats.org/officeDocument/2006/relationships" xmlns:p="http://schemas.openxmlformats.org/presentationml/2006/main">
   <p:cSld>
     <p:spTree>
@@ -4794,563 +5558,18 @@
   <p:clrMapOvr>
     <a:masterClrMapping/>
   </p:clrMapOvr>
-  <p:timing>
-    <p:tnLst>
-      <p:par>
-        <p:cTn xmlns:p14="http://schemas.microsoft.com/office/powerpoint/2010/main" id="1" dur="indefinite" restart="never" nodeType="tmRoot"/>
-      </p:par>
-    </p:tnLst>
-  </p:timing>
-</p:sld>
-</file>
-
-<file path=ppt/slides/slide4.xml><?xml version="1.0" encoding="utf-8"?>
-<p:sld xmlns:a="http://schemas.openxmlformats.org/drawingml/2006/main" xmlns:r="http://schemas.openxmlformats.org/officeDocument/2006/relationships" xmlns:p="http://schemas.openxmlformats.org/presentationml/2006/main">
-  <p:cSld>
-    <p:spTree>
-      <p:nvGrpSpPr>
-        <p:cNvPr id="1" name=""/>
-        <p:cNvGrpSpPr/>
-        <p:nvPr/>
-      </p:nvGrpSpPr>
-      <p:grpSpPr>
-        <a:xfrm>
-          <a:off x="0" y="0"/>
-          <a:ext cx="0" cy="0"/>
-          <a:chOff x="0" y="0"/>
-          <a:chExt cx="0" cy="0"/>
-        </a:xfrm>
-      </p:grpSpPr>
-      <p:sp>
-        <p:nvSpPr>
-          <p:cNvPr id="2" name="Title 1"/>
-          <p:cNvSpPr>
-            <a:spLocks noGrp="1"/>
-          </p:cNvSpPr>
-          <p:nvPr>
-            <p:ph type="ctrTitle"/>
-          </p:nvPr>
-        </p:nvSpPr>
-        <p:spPr/>
-        <p:txBody>
-          <a:bodyPr/>
-          <a:lstStyle/>
-          <a:p>
-            <a:r>
-              <a:rPr lang="en-US" dirty="0" smtClean="0"/>
-              <a:t>How do we use it?</a:t>
-            </a:r>
-            <a:endParaRPr lang="en-US" dirty="0"/>
-          </a:p>
-        </p:txBody>
-      </p:sp>
-      <p:sp>
-        <p:nvSpPr>
-          <p:cNvPr id="3" name="Subtitle 2"/>
-          <p:cNvSpPr>
-            <a:spLocks noGrp="1"/>
-          </p:cNvSpPr>
-          <p:nvPr>
-            <p:ph type="subTitle" idx="1"/>
-          </p:nvPr>
-        </p:nvSpPr>
-        <p:spPr>
-          <a:xfrm>
-            <a:off x="611560" y="1977380"/>
-            <a:ext cx="5832648" cy="2250554"/>
-          </a:xfrm>
-        </p:spPr>
-        <p:txBody>
-          <a:bodyPr>
-            <a:normAutofit/>
-          </a:bodyPr>
-          <a:lstStyle/>
-          <a:p>
-            <a:pPr marL="457200" indent="-457200">
-              <a:buFont typeface="Arial" panose="020B0604020202020204" pitchFamily="34" charset="0"/>
-              <a:buChar char="•"/>
-            </a:pPr>
-            <a:r>
-              <a:rPr lang="en-US" dirty="0" smtClean="0"/>
-              <a:t>Node.js</a:t>
-            </a:r>
-          </a:p>
-          <a:p>
-            <a:pPr marL="457200" indent="-457200">
-              <a:buFont typeface="Arial" panose="020B0604020202020204" pitchFamily="34" charset="0"/>
-              <a:buChar char="•"/>
-            </a:pPr>
-            <a:r>
-              <a:rPr lang="en-US" dirty="0" err="1" smtClean="0"/>
-              <a:t>npm</a:t>
-            </a:r>
-            <a:r>
-              <a:rPr lang="en-US" dirty="0" smtClean="0"/>
-              <a:t> (node package manager)</a:t>
-            </a:r>
-          </a:p>
-          <a:p>
-            <a:pPr marL="457200" indent="-457200">
-              <a:buFont typeface="Arial" panose="020B0604020202020204" pitchFamily="34" charset="0"/>
-              <a:buChar char="•"/>
-            </a:pPr>
-            <a:r>
-              <a:rPr lang="en-US" dirty="0" smtClean="0"/>
-              <a:t>Gulp.js</a:t>
-            </a:r>
-          </a:p>
-          <a:p>
-            <a:pPr marL="457200" indent="-457200">
-              <a:buFont typeface="Arial" panose="020B0604020202020204" pitchFamily="34" charset="0"/>
-              <a:buChar char="•"/>
-            </a:pPr>
-            <a:r>
-              <a:rPr lang="en-US" dirty="0" smtClean="0"/>
-              <a:t>CSS</a:t>
-            </a:r>
-            <a:endParaRPr lang="en-US" dirty="0"/>
-          </a:p>
-        </p:txBody>
-      </p:sp>
-    </p:spTree>
-    <p:extLst>
-      <p:ext uri="{BB962C8B-B14F-4D97-AF65-F5344CB8AC3E}">
-        <p14:creationId xmlns:p14="http://schemas.microsoft.com/office/powerpoint/2010/main" val="3060360801"/>
-      </p:ext>
-    </p:extLst>
-  </p:cSld>
-  <p:clrMapOvr>
-    <a:masterClrMapping/>
-  </p:clrMapOvr>
-  <p:timing>
-    <p:tnLst>
-      <p:par>
-        <p:cTn xmlns:p14="http://schemas.microsoft.com/office/powerpoint/2010/main" id="1" dur="indefinite" restart="never" nodeType="tmRoot"/>
-      </p:par>
-    </p:tnLst>
-  </p:timing>
-</p:sld>
-</file>
-
-<file path=ppt/slides/slide5.xml><?xml version="1.0" encoding="utf-8"?>
-<p:sld xmlns:a="http://schemas.openxmlformats.org/drawingml/2006/main" xmlns:r="http://schemas.openxmlformats.org/officeDocument/2006/relationships" xmlns:p="http://schemas.openxmlformats.org/presentationml/2006/main">
-  <p:cSld>
-    <p:spTree>
-      <p:nvGrpSpPr>
-        <p:cNvPr id="1" name=""/>
-        <p:cNvGrpSpPr/>
-        <p:nvPr/>
-      </p:nvGrpSpPr>
-      <p:grpSpPr>
-        <a:xfrm>
-          <a:off x="0" y="0"/>
-          <a:ext cx="0" cy="0"/>
-          <a:chOff x="0" y="0"/>
-          <a:chExt cx="0" cy="0"/>
-        </a:xfrm>
-      </p:grpSpPr>
-      <p:sp>
-        <p:nvSpPr>
-          <p:cNvPr id="2" name="Title 1"/>
-          <p:cNvSpPr>
-            <a:spLocks noGrp="1"/>
-          </p:cNvSpPr>
-          <p:nvPr>
-            <p:ph type="ctrTitle"/>
-          </p:nvPr>
-        </p:nvSpPr>
-        <p:spPr/>
-        <p:txBody>
-          <a:bodyPr/>
-          <a:lstStyle/>
-          <a:p>
-            <a:r>
-              <a:rPr lang="en-US" dirty="0" smtClean="0"/>
-              <a:t>Usage</a:t>
-            </a:r>
-            <a:endParaRPr lang="en-US" dirty="0"/>
-          </a:p>
-        </p:txBody>
-      </p:sp>
-      <p:sp>
-        <p:nvSpPr>
-          <p:cNvPr id="3" name="Subtitle 2"/>
-          <p:cNvSpPr>
-            <a:spLocks noGrp="1"/>
-          </p:cNvSpPr>
-          <p:nvPr>
-            <p:ph type="subTitle" idx="1"/>
-          </p:nvPr>
-        </p:nvSpPr>
-        <p:spPr>
-          <a:xfrm>
-            <a:off x="611560" y="1977380"/>
-            <a:ext cx="5832648" cy="2754610"/>
-          </a:xfrm>
-        </p:spPr>
-        <p:txBody>
-          <a:bodyPr>
-            <a:normAutofit/>
-          </a:bodyPr>
-          <a:lstStyle/>
-          <a:p>
-            <a:pPr marL="457200" indent="-457200">
-              <a:buFont typeface="Arial" panose="020B0604020202020204" pitchFamily="34" charset="0"/>
-              <a:buChar char="•"/>
-            </a:pPr>
-            <a:r>
-              <a:rPr lang="en-US" dirty="0"/>
-              <a:t>Add </a:t>
-            </a:r>
-            <a:r>
-              <a:rPr lang="en-US" dirty="0" err="1"/>
-              <a:t>PostCSS</a:t>
-            </a:r>
-            <a:r>
-              <a:rPr lang="en-US" dirty="0"/>
-              <a:t> to your build tool.</a:t>
-            </a:r>
-          </a:p>
-          <a:p>
-            <a:pPr marL="457200" indent="-457200">
-              <a:buFont typeface="Arial" panose="020B0604020202020204" pitchFamily="34" charset="0"/>
-              <a:buChar char="•"/>
-            </a:pPr>
-            <a:r>
-              <a:rPr lang="en-US" dirty="0"/>
-              <a:t>Select plugins </a:t>
-            </a:r>
-            <a:r>
-              <a:rPr lang="en-US" dirty="0" smtClean="0"/>
-              <a:t>and </a:t>
-            </a:r>
-            <a:r>
-              <a:rPr lang="en-US" dirty="0"/>
-              <a:t>add them to your </a:t>
-            </a:r>
-            <a:r>
-              <a:rPr lang="en-US" dirty="0" err="1"/>
-              <a:t>PostCSS</a:t>
-            </a:r>
-            <a:r>
-              <a:rPr lang="en-US" dirty="0"/>
-              <a:t> process.</a:t>
-            </a:r>
-          </a:p>
-          <a:p>
-            <a:pPr marL="457200" indent="-457200">
-              <a:buFont typeface="Arial" panose="020B0604020202020204" pitchFamily="34" charset="0"/>
-              <a:buChar char="•"/>
-            </a:pPr>
-            <a:r>
-              <a:rPr lang="en-US" dirty="0" smtClean="0"/>
-              <a:t>There are plugins for Grunt, Gulp, </a:t>
-            </a:r>
-            <a:r>
-              <a:rPr lang="en-US" dirty="0" err="1" smtClean="0"/>
-              <a:t>webpack</a:t>
-            </a:r>
-            <a:r>
-              <a:rPr lang="en-US" dirty="0" smtClean="0"/>
-              <a:t>, Broccoli, Brunch and ENB.</a:t>
-            </a:r>
-            <a:endParaRPr lang="en-US" dirty="0"/>
-          </a:p>
-        </p:txBody>
-      </p:sp>
-    </p:spTree>
-    <p:extLst>
-      <p:ext uri="{BB962C8B-B14F-4D97-AF65-F5344CB8AC3E}">
-        <p14:creationId xmlns:p14="http://schemas.microsoft.com/office/powerpoint/2010/main" val="216392634"/>
-      </p:ext>
-    </p:extLst>
-  </p:cSld>
-  <p:clrMapOvr>
-    <a:masterClrMapping/>
-  </p:clrMapOvr>
-  <p:timing>
-    <p:tnLst>
-      <p:par>
-        <p:cTn xmlns:p14="http://schemas.microsoft.com/office/powerpoint/2010/main" id="1" dur="indefinite" restart="never" nodeType="tmRoot"/>
-      </p:par>
-    </p:tnLst>
-  </p:timing>
-</p:sld>
-</file>
-
-<file path=ppt/slides/slide6.xml><?xml version="1.0" encoding="utf-8"?>
-<p:sld xmlns:a="http://schemas.openxmlformats.org/drawingml/2006/main" xmlns:r="http://schemas.openxmlformats.org/officeDocument/2006/relationships" xmlns:p="http://schemas.openxmlformats.org/presentationml/2006/main">
-  <p:cSld>
-    <p:spTree>
-      <p:nvGrpSpPr>
-        <p:cNvPr id="1" name=""/>
-        <p:cNvGrpSpPr/>
-        <p:nvPr/>
-      </p:nvGrpSpPr>
-      <p:grpSpPr>
-        <a:xfrm>
-          <a:off x="0" y="0"/>
-          <a:ext cx="0" cy="0"/>
-          <a:chOff x="0" y="0"/>
-          <a:chExt cx="0" cy="0"/>
-        </a:xfrm>
-      </p:grpSpPr>
-      <p:sp>
-        <p:nvSpPr>
-          <p:cNvPr id="2" name="Title 1"/>
-          <p:cNvSpPr>
-            <a:spLocks noGrp="1"/>
-          </p:cNvSpPr>
-          <p:nvPr>
-            <p:ph type="ctrTitle"/>
-          </p:nvPr>
-        </p:nvSpPr>
-        <p:spPr/>
-        <p:txBody>
-          <a:bodyPr/>
-          <a:lstStyle/>
-          <a:p>
-            <a:r>
-              <a:rPr lang="hr-HR" dirty="0" err="1" smtClean="0"/>
-              <a:t>Plugins</a:t>
-            </a:r>
-            <a:endParaRPr lang="en-US" dirty="0"/>
-          </a:p>
-        </p:txBody>
-      </p:sp>
-      <p:sp>
-        <p:nvSpPr>
-          <p:cNvPr id="3" name="Subtitle 2"/>
-          <p:cNvSpPr>
-            <a:spLocks noGrp="1"/>
-          </p:cNvSpPr>
-          <p:nvPr>
-            <p:ph type="subTitle" idx="1"/>
-          </p:nvPr>
-        </p:nvSpPr>
-        <p:spPr>
-          <a:xfrm>
-            <a:off x="611560" y="1563638"/>
-            <a:ext cx="6192688" cy="3384376"/>
-          </a:xfrm>
-        </p:spPr>
-        <p:txBody>
-          <a:bodyPr>
-            <a:normAutofit fontScale="92500" lnSpcReduction="20000"/>
-          </a:bodyPr>
-          <a:lstStyle/>
-          <a:p>
-            <a:pPr marL="457200" indent="-457200">
-              <a:lnSpc>
-                <a:spcPct val="110000"/>
-              </a:lnSpc>
-              <a:buFont typeface="Arial"/>
-              <a:buChar char="•"/>
-            </a:pPr>
-            <a:r>
-              <a:rPr lang="ta-IN" dirty="0" smtClean="0"/>
-              <a:t>Mixins</a:t>
-            </a:r>
-            <a:r>
-              <a:rPr lang="ta-IN" dirty="0"/>
-              <a:t> – </a:t>
-            </a:r>
-            <a:r>
-              <a:rPr lang="en-US" dirty="0" err="1" smtClean="0"/>
-              <a:t>postcss</a:t>
-            </a:r>
-            <a:r>
-              <a:rPr lang="en-US" dirty="0" err="1"/>
-              <a:t>-mixins</a:t>
-            </a:r>
-            <a:endParaRPr lang="en-US" dirty="0"/>
-          </a:p>
-          <a:p>
-            <a:pPr marL="457200" indent="-457200">
-              <a:lnSpc>
-                <a:spcPct val="110000"/>
-              </a:lnSpc>
-              <a:buFont typeface="Arial"/>
-              <a:buChar char="•"/>
-            </a:pPr>
-            <a:r>
-              <a:rPr lang="ta-IN" dirty="0"/>
-              <a:t>Variables – </a:t>
-            </a:r>
-            <a:r>
-              <a:rPr lang="en-US" dirty="0" err="1"/>
-              <a:t>postcss</a:t>
-            </a:r>
-            <a:r>
-              <a:rPr lang="en-US" dirty="0"/>
-              <a:t>-simple-</a:t>
-            </a:r>
-            <a:r>
-              <a:rPr lang="en-US" dirty="0" err="1"/>
-              <a:t>vars</a:t>
-            </a:r>
-            <a:endParaRPr lang="en-US" dirty="0"/>
-          </a:p>
-          <a:p>
-            <a:pPr marL="457200" indent="-457200">
-              <a:lnSpc>
-                <a:spcPct val="110000"/>
-              </a:lnSpc>
-              <a:buFont typeface="Arial"/>
-              <a:buChar char="•"/>
-            </a:pPr>
-            <a:r>
-              <a:rPr lang="ta-IN" dirty="0" smtClean="0"/>
-              <a:t>Nesting</a:t>
-            </a:r>
-            <a:r>
-              <a:rPr lang="ta-IN" dirty="0"/>
-              <a:t> – </a:t>
-            </a:r>
-            <a:r>
-              <a:rPr lang="en-US" dirty="0" err="1" smtClean="0"/>
-              <a:t>postcss</a:t>
-            </a:r>
-            <a:r>
-              <a:rPr lang="en-US" dirty="0"/>
-              <a:t>-nested</a:t>
-            </a:r>
-          </a:p>
-          <a:p>
-            <a:pPr marL="457200" indent="-457200">
-              <a:lnSpc>
-                <a:spcPct val="110000"/>
-              </a:lnSpc>
-              <a:buFont typeface="Arial"/>
-              <a:buChar char="•"/>
-            </a:pPr>
-            <a:r>
-              <a:rPr lang="ta-IN" dirty="0"/>
-              <a:t>C</a:t>
-            </a:r>
-            <a:r>
-              <a:rPr lang="en-US" dirty="0" err="1"/>
-              <a:t>ustom</a:t>
-            </a:r>
-            <a:r>
-              <a:rPr lang="ta-IN" dirty="0"/>
-              <a:t> </a:t>
-            </a:r>
-            <a:r>
-              <a:rPr lang="en-US" dirty="0"/>
-              <a:t>Media</a:t>
-            </a:r>
-            <a:r>
-              <a:rPr lang="ta-IN" dirty="0"/>
-              <a:t> </a:t>
-            </a:r>
-            <a:r>
-              <a:rPr lang="ta-IN" dirty="0" smtClean="0"/>
-              <a:t>Queries</a:t>
-            </a:r>
-            <a:r>
-              <a:rPr lang="ta-IN" dirty="0"/>
-              <a:t> – </a:t>
-            </a:r>
-            <a:r>
-              <a:rPr lang="en-US" dirty="0" err="1" smtClean="0"/>
-              <a:t>postcss</a:t>
-            </a:r>
-            <a:r>
-              <a:rPr lang="en-US" dirty="0"/>
-              <a:t>-custom-media</a:t>
-            </a:r>
-          </a:p>
-          <a:p>
-            <a:pPr marL="457200" indent="-457200">
-              <a:lnSpc>
-                <a:spcPct val="110000"/>
-              </a:lnSpc>
-              <a:buFont typeface="Arial"/>
-              <a:buChar char="•"/>
-            </a:pPr>
-            <a:r>
-              <a:rPr lang="ta-IN" dirty="0"/>
-              <a:t>Minification – </a:t>
-            </a:r>
-            <a:r>
-              <a:rPr lang="en-US" dirty="0" err="1"/>
-              <a:t>cssnano</a:t>
-            </a:r>
-            <a:endParaRPr lang="en-US" dirty="0"/>
-          </a:p>
-          <a:p>
-            <a:pPr marL="457200" indent="-457200">
-              <a:lnSpc>
-                <a:spcPct val="110000"/>
-              </a:lnSpc>
-              <a:buFont typeface="Arial"/>
-              <a:buChar char="•"/>
-            </a:pPr>
-            <a:r>
-              <a:rPr lang="ta-IN" dirty="0"/>
-              <a:t>Pixels to </a:t>
-            </a:r>
-            <a:r>
-              <a:rPr lang="ta-IN" dirty="0" smtClean="0"/>
-              <a:t>REM</a:t>
-            </a:r>
-            <a:r>
-              <a:rPr lang="ta-IN" dirty="0"/>
-              <a:t> – </a:t>
-            </a:r>
-            <a:r>
-              <a:rPr lang="en-US" dirty="0" err="1" smtClean="0"/>
-              <a:t>postcss</a:t>
-            </a:r>
-            <a:r>
-              <a:rPr lang="en-US" dirty="0" err="1"/>
-              <a:t>-pxtorem</a:t>
-            </a:r>
-            <a:endParaRPr lang="en-US" dirty="0"/>
-          </a:p>
-          <a:p>
-            <a:pPr marL="457200" indent="-457200">
-              <a:lnSpc>
-                <a:spcPct val="110000"/>
-              </a:lnSpc>
-              <a:buFont typeface="Arial"/>
-              <a:buChar char="•"/>
-            </a:pPr>
-            <a:r>
-              <a:rPr lang="ta-IN" dirty="0" smtClean="0"/>
-              <a:t>A</a:t>
-            </a:r>
-            <a:r>
-              <a:rPr lang="en-US" dirty="0" err="1" smtClean="0"/>
-              <a:t>utoprefixer</a:t>
-            </a:r>
-            <a:r>
-              <a:rPr lang="ta-IN" dirty="0"/>
-              <a:t> – </a:t>
-            </a:r>
-            <a:r>
-              <a:rPr lang="en-US" dirty="0" err="1" smtClean="0"/>
-              <a:t>autoprefixer</a:t>
-            </a:r>
-            <a:r>
-              <a:rPr lang="en-US" dirty="0"/>
-              <a:t>-core</a:t>
-            </a:r>
-            <a:endParaRPr lang="en-US" dirty="0"/>
-          </a:p>
-        </p:txBody>
-      </p:sp>
-    </p:spTree>
-    <p:extLst>
-      <p:ext uri="{BB962C8B-B14F-4D97-AF65-F5344CB8AC3E}">
-        <p14:creationId xmlns:p14="http://schemas.microsoft.com/office/powerpoint/2010/main" val="3267037310"/>
-      </p:ext>
-    </p:extLst>
-  </p:cSld>
-  <p:clrMapOvr>
-    <a:masterClrMapping/>
-  </p:clrMapOvr>
+  <mc:AlternateContent xmlns:mc="http://schemas.openxmlformats.org/markup-compatibility/2006">
+    <mc:Choice xmlns:p14="http://schemas.microsoft.com/office/powerpoint/2010/main" Requires="p14">
+      <p:transition spd="med" p14:dur="700">
+        <p:fade/>
+      </p:transition>
+    </mc:Choice>
+    <mc:Fallback>
+      <p:transition xmlns:p14="http://schemas.microsoft.com/office/powerpoint/2010/main" spd="med">
+        <p:fade/>
+      </p:transition>
+    </mc:Fallback>
+  </mc:AlternateContent>
   <p:timing>
     <p:tnLst>
       <p:par>
@@ -5479,6 +5698,18 @@
   <p:clrMapOvr>
     <a:masterClrMapping/>
   </p:clrMapOvr>
+  <mc:AlternateContent xmlns:mc="http://schemas.openxmlformats.org/markup-compatibility/2006">
+    <mc:Choice xmlns:p14="http://schemas.microsoft.com/office/powerpoint/2010/main" Requires="p14">
+      <p:transition spd="med" p14:dur="700">
+        <p:fade/>
+      </p:transition>
+    </mc:Choice>
+    <mc:Fallback>
+      <p:transition xmlns:p14="http://schemas.microsoft.com/office/powerpoint/2010/main" spd="med">
+        <p:fade/>
+      </p:transition>
+    </mc:Fallback>
+  </mc:AlternateContent>
   <p:timing>
     <p:tnLst>
       <p:par>
@@ -5492,7 +5723,7 @@
 <file path=ppt/theme/theme1.xml><?xml version="1.0" encoding="utf-8"?>
 <a:theme xmlns:a="http://schemas.openxmlformats.org/drawingml/2006/main" name="Office Theme">
   <a:themeElements>
-    <a:clrScheme name="Office">
+    <a:clrScheme name="Custom 1">
       <a:dk1>
         <a:sysClr val="windowText" lastClr="000000"/>
       </a:dk1>
@@ -5524,7 +5755,7 @@
         <a:srgbClr val="F79646"/>
       </a:accent6>
       <a:hlink>
-        <a:srgbClr val="0000FF"/>
+        <a:srgbClr val="FFFCF1"/>
       </a:hlink>
       <a:folHlink>
         <a:srgbClr val="800080"/>
@@ -6029,7 +6260,7 @@
   <a:extraClrSchemeLst/>
   <a:extLst>
     <a:ext uri="{05A4C25C-085E-4340-85A3-A5531E510DB2}">
-      <thm15:themeFamily xmlns:thm15="http://schemas.microsoft.com/office/thememl/2012/main" xmlns="" name="Office Theme" id="{62F939B6-93AF-4DB8-9C6B-D6C7DFDC589F}" vid="{4A3C46E8-61CC-4603-A589-7422A47A8E4A}"/>
+      <thm15:themeFamily xmlns="" xmlns:thm15="http://schemas.microsoft.com/office/thememl/2012/main" name="Office Theme" id="{62F939B6-93AF-4DB8-9C6B-D6C7DFDC589F}" vid="{4A3C46E8-61CC-4603-A589-7422A47A8E4A}"/>
     </a:ext>
   </a:extLst>
 </a:theme>

</xml_diff>

<commit_message>
Added .ppsx and styling fixes
</commit_message>
<xml_diff>
--- a/PostCSS.pptx
+++ b/PostCSS.pptx
@@ -121,7 +121,7 @@
   </p:defaultTextStyle>
   <p:extLst>
     <p:ext uri="{EFAFB233-063F-42B5-8137-9DF3F51BA10A}">
-      <p15:sldGuideLst xmlns="" xmlns:p15="http://schemas.microsoft.com/office/powerpoint/2012/main">
+      <p15:sldGuideLst xmlns:p15="http://schemas.microsoft.com/office/powerpoint/2012/main">
         <p15:guide id="1" orient="horz" pos="1620">
           <p15:clr>
             <a:srgbClr val="A4A3A4"/>
@@ -159,10 +159,10 @@
           <c:layoutTarget val="inner"/>
           <c:xMode val="edge"/>
           <c:yMode val="edge"/>
-          <c:x val="0.141984802614524"/>
-          <c:y val="0.0902354518748563"/>
-          <c:w val="0.846499835958005"/>
-          <c:h val="0.909764548125144"/>
+          <c:x val="0.14198480261452401"/>
+          <c:y val="9.0235451874856307E-2"/>
+          <c:w val="0.84649983595800504"/>
+          <c:h val="0.90976454812514396"/>
         </c:manualLayout>
       </c:layout>
       <c:barChart>
@@ -234,16 +234,16 @@
                 <c:formatCode>General</c:formatCode>
                 <c:ptCount val="4"/>
                 <c:pt idx="0">
-                  <c:v>136.0</c:v>
+                  <c:v>136</c:v>
                 </c:pt>
                 <c:pt idx="1">
-                  <c:v>160.0</c:v>
+                  <c:v>160</c:v>
                 </c:pt>
                 <c:pt idx="2">
-                  <c:v>167.0</c:v>
+                  <c:v>167</c:v>
                 </c:pt>
                 <c:pt idx="3">
-                  <c:v>1084.0</c:v>
+                  <c:v>1084</c:v>
                 </c:pt>
               </c:numCache>
             </c:numRef>
@@ -258,11 +258,11 @@
           <c:showBubbleSize val="0"/>
         </c:dLbls>
         <c:gapWidth val="182"/>
-        <c:axId val="2133779192"/>
-        <c:axId val="2133782856"/>
+        <c:axId val="324737712"/>
+        <c:axId val="324739280"/>
       </c:barChart>
       <c:catAx>
-        <c:axId val="2133779192"/>
+        <c:axId val="324737712"/>
         <c:scaling>
           <c:orientation val="maxMin"/>
         </c:scaling>
@@ -297,7 +297,7 @@
             <a:endParaRPr lang="en-US"/>
           </a:p>
         </c:txPr>
-        <c:crossAx val="2133782856"/>
+        <c:crossAx val="324739280"/>
         <c:crosses val="autoZero"/>
         <c:auto val="1"/>
         <c:lblAlgn val="ctr"/>
@@ -305,7 +305,7 @@
         <c:noMultiLvlLbl val="0"/>
       </c:catAx>
       <c:valAx>
-        <c:axId val="2133782856"/>
+        <c:axId val="324739280"/>
         <c:scaling>
           <c:orientation val="minMax"/>
         </c:scaling>
@@ -315,7 +315,7 @@
         <c:majorTickMark val="none"/>
         <c:minorTickMark val="none"/>
         <c:tickLblPos val="nextTo"/>
-        <c:crossAx val="2133779192"/>
+        <c:crossAx val="324737712"/>
         <c:crosses val="autoZero"/>
         <c:crossBetween val="between"/>
       </c:valAx>
@@ -348,7 +348,7 @@
       <a:endParaRPr lang="en-US"/>
     </a:p>
   </c:txPr>
-  <c:externalData r:id="rId1">
+  <c:externalData r:id="rId3">
     <c:autoUpdate val="0"/>
   </c:externalData>
 </c:chartSpace>
@@ -981,7 +981,7 @@
           <a:p>
             <a:fld id="{78D58CAC-08B7-A14A-A803-4130755B2945}" type="datetimeFigureOut">
               <a:rPr lang="en-US" smtClean="0"/>
-              <a:t>23/08/15</a:t>
+              <a:t>9/7/2015</a:t>
             </a:fld>
             <a:endParaRPr lang="en-US"/>
           </a:p>
@@ -1146,7 +1146,7 @@
           <a:p>
             <a:fld id="{12F3DFAC-2CAA-464E-91A0-2BBEFEA0B668}" type="datetimeFigureOut">
               <a:rPr lang="en-US" smtClean="0"/>
-              <a:t>23/08/15</a:t>
+              <a:t>9/7/2015</a:t>
             </a:fld>
             <a:endParaRPr lang="en-US"/>
           </a:p>
@@ -1543,12 +1543,20 @@
           <a:lstStyle/>
           <a:p>
             <a:r>
-              <a:rPr lang="en-US" dirty="0" err="1" smtClean="0"/>
-              <a:t>Andrey</a:t>
+              <a:rPr lang="hr-HR" dirty="0" smtClean="0"/>
+              <a:t>- </a:t>
+            </a:r>
+            <a:r>
+              <a:rPr lang="hr-HR" dirty="0" err="1" smtClean="0"/>
+              <a:t>author</a:t>
+            </a:r>
+            <a:r>
+              <a:rPr lang="hr-HR" dirty="0" smtClean="0"/>
+              <a:t>: </a:t>
             </a:r>
             <a:r>
               <a:rPr lang="en-US" dirty="0" smtClean="0"/>
-              <a:t> </a:t>
+              <a:t>Andrey </a:t>
             </a:r>
             <a:r>
               <a:rPr lang="en-US" dirty="0" err="1" smtClean="0"/>
@@ -1561,13 +1569,21 @@
             <a:endParaRPr lang="en-US" dirty="0" smtClean="0"/>
           </a:p>
           <a:p>
-            <a:pPr marL="171450" indent="-171450">
+            <a:pPr marL="0" indent="0">
               <a:buFontTx/>
-              <a:buChar char="-"/>
+              <a:buNone/>
             </a:pPr>
             <a:r>
+              <a:rPr lang="hr-HR" dirty="0" smtClean="0"/>
+              <a:t>- </a:t>
+            </a:r>
+            <a:r>
               <a:rPr lang="en-US" dirty="0" smtClean="0"/>
-              <a:t>open source</a:t>
+              <a:t>open </a:t>
+            </a:r>
+            <a:r>
+              <a:rPr lang="en-US" dirty="0" smtClean="0"/>
+              <a:t>source</a:t>
             </a:r>
             <a:endParaRPr lang="ta-IN" dirty="0" smtClean="0"/>
           </a:p>
@@ -1653,9 +1669,9 @@
           <a:bodyPr/>
           <a:lstStyle/>
           <a:p>
-            <a:pPr marL="171450" indent="-171450">
+            <a:pPr marL="0" indent="0">
               <a:buFontTx/>
-              <a:buChar char="-"/>
+              <a:buNone/>
             </a:pPr>
             <a:r>
               <a:rPr lang="en-US" dirty="0" smtClean="0"/>
@@ -1663,11 +1679,39 @@
             </a:r>
             <a:r>
               <a:rPr lang="ta-IN" dirty="0" smtClean="0"/>
-              <a:t>.js file </a:t>
-            </a:r>
-            <a:r>
-              <a:rPr lang="en-US" dirty="0" err="1" smtClean="0"/>
-              <a:t>alat</a:t>
+              <a:t>.js </a:t>
+            </a:r>
+            <a:r>
+              <a:rPr lang="hr-HR" dirty="0" err="1" smtClean="0"/>
+              <a:t>is</a:t>
+            </a:r>
+            <a:r>
+              <a:rPr lang="hr-HR" dirty="0" smtClean="0"/>
+              <a:t> a </a:t>
+            </a:r>
+            <a:r>
+              <a:rPr lang="hr-HR" baseline="0" dirty="0" smtClean="0"/>
+              <a:t>post-processing </a:t>
+            </a:r>
+            <a:r>
+              <a:rPr lang="hr-HR" dirty="0" err="1" smtClean="0"/>
+              <a:t>tool</a:t>
+            </a:r>
+            <a:r>
+              <a:rPr lang="hr-HR" dirty="0" smtClean="0"/>
+              <a:t> </a:t>
+            </a:r>
+            <a:r>
+              <a:rPr lang="hr-HR" dirty="0" err="1" smtClean="0"/>
+              <a:t>by</a:t>
+            </a:r>
+            <a:r>
+              <a:rPr lang="hr-HR" dirty="0" smtClean="0"/>
+              <a:t> </a:t>
+            </a:r>
+            <a:r>
+              <a:rPr lang="hr-HR" dirty="0" err="1" smtClean="0"/>
+              <a:t>definition</a:t>
             </a:r>
             <a:endParaRPr lang="ta-IN" dirty="0" smtClean="0"/>
           </a:p>
@@ -1844,45 +1888,28 @@
           <a:p>
             <a:r>
               <a:rPr lang="en-US" dirty="0" smtClean="0"/>
-              <a:t>-   Bootstrap CSS</a:t>
-            </a:r>
-            <a:r>
-              <a:rPr lang="en-US" baseline="0" dirty="0" smtClean="0"/>
-              <a:t> – 100 </a:t>
-            </a:r>
-            <a:r>
-              <a:rPr lang="en-US" baseline="0" dirty="0" err="1" smtClean="0"/>
-              <a:t>mixina</a:t>
-            </a:r>
-            <a:r>
-              <a:rPr lang="en-US" baseline="0" dirty="0" smtClean="0"/>
-              <a:t>, </a:t>
-            </a:r>
-            <a:r>
-              <a:rPr lang="en-US" baseline="0" dirty="0" err="1" smtClean="0"/>
-              <a:t>variabli</a:t>
-            </a:r>
-            <a:r>
-              <a:rPr lang="en-US" baseline="0" dirty="0" smtClean="0"/>
-              <a:t> </a:t>
-            </a:r>
-            <a:r>
-              <a:rPr lang="en-US" baseline="0" dirty="0" err="1" smtClean="0"/>
-              <a:t>i</a:t>
-            </a:r>
-            <a:r>
-              <a:rPr lang="en-US" baseline="0" dirty="0" smtClean="0"/>
-              <a:t> </a:t>
-            </a:r>
-            <a:r>
-              <a:rPr lang="en-US" baseline="0" dirty="0" smtClean="0"/>
-              <a:t>nest</a:t>
-            </a:r>
-            <a:r>
-              <a:rPr lang="ta-IN" baseline="0" dirty="0" smtClean="0"/>
-              <a:t>ing pravila</a:t>
-            </a:r>
-            <a:endParaRPr lang="en-US" dirty="0" smtClean="0"/>
+              <a:t>-   </a:t>
+            </a:r>
+            <a:r>
+              <a:rPr lang="en-US" dirty="0" smtClean="0"/>
+              <a:t>Compare CSS processors for </a:t>
+            </a:r>
+            <a:r>
+              <a:rPr lang="en-US" dirty="0" err="1" smtClean="0"/>
+              <a:t>parsings</a:t>
+            </a:r>
+            <a:r>
+              <a:rPr lang="en-US" dirty="0" smtClean="0"/>
+              <a:t>, nested rules, </a:t>
+            </a:r>
+            <a:r>
+              <a:rPr lang="en-US" dirty="0" err="1" smtClean="0"/>
+              <a:t>mixins</a:t>
+            </a:r>
+            <a:r>
+              <a:rPr lang="en-US" dirty="0" smtClean="0"/>
+              <a:t>, variables and math</a:t>
+            </a:r>
           </a:p>
           <a:p>
             <a:pPr marL="171450" indent="-171450">
@@ -1890,25 +1917,46 @@
               <a:buChar char="-"/>
             </a:pPr>
             <a:r>
-              <a:rPr lang="en-US" dirty="0" smtClean="0"/>
-              <a:t>PostCSS </a:t>
-            </a:r>
-            <a:r>
               <a:rPr lang="en-US" dirty="0" err="1" smtClean="0"/>
-              <a:t>pisan</a:t>
-            </a:r>
-            <a:r>
-              <a:rPr lang="en-US" dirty="0" smtClean="0"/>
-              <a:t> u JS je 3 x </a:t>
-            </a:r>
-            <a:r>
-              <a:rPr lang="en-US" dirty="0" err="1" smtClean="0"/>
-              <a:t>brži</a:t>
+              <a:t>PostCSS</a:t>
             </a:r>
             <a:r>
               <a:rPr lang="en-US" dirty="0" smtClean="0"/>
               <a:t> </a:t>
             </a:r>
+            <a:r>
+              <a:rPr lang="hr-HR" dirty="0" err="1" smtClean="0"/>
+              <a:t>writen</a:t>
+            </a:r>
+            <a:r>
+              <a:rPr lang="en-US" dirty="0" smtClean="0"/>
+              <a:t> </a:t>
+            </a:r>
+            <a:r>
+              <a:rPr lang="hr-HR" dirty="0" err="1" smtClean="0"/>
+              <a:t>in</a:t>
+            </a:r>
+            <a:r>
+              <a:rPr lang="en-US" dirty="0" smtClean="0"/>
+              <a:t> JS </a:t>
+            </a:r>
+            <a:r>
+              <a:rPr lang="hr-HR" dirty="0" err="1" smtClean="0"/>
+              <a:t>is</a:t>
+            </a:r>
+            <a:r>
+              <a:rPr lang="en-US" dirty="0" smtClean="0"/>
+              <a:t> 3 x</a:t>
+            </a:r>
+            <a:r>
+              <a:rPr lang="hr-HR" baseline="0" dirty="0" smtClean="0"/>
+              <a:t> </a:t>
+            </a:r>
+            <a:r>
+              <a:rPr lang="hr-HR" baseline="0" dirty="0" err="1" smtClean="0"/>
+              <a:t>faster</a:t>
+            </a:r>
+            <a:endParaRPr lang="en-US" dirty="0" smtClean="0"/>
           </a:p>
           <a:p>
             <a:pPr marL="171450" indent="-171450">
@@ -1921,11 +1969,7 @@
             </a:r>
             <a:r>
               <a:rPr lang="ta-IN" dirty="0" smtClean="0"/>
-              <a:t>ibasss </a:t>
-            </a:r>
-            <a:r>
-              <a:rPr lang="ta-IN" dirty="0" smtClean="0"/>
-              <a:t>21 300 LOC</a:t>
+              <a:t>ibasss 21 300 LOC</a:t>
             </a:r>
           </a:p>
           <a:p>
@@ -2293,13 +2337,13 @@
   <p:clrMapOvr>
     <a:masterClrMapping/>
   </p:clrMapOvr>
-  <p:transition xmlns:p14="http://schemas.microsoft.com/office/powerpoint/2010/main" spd="slow">
+  <p:transition spd="slow">
     <p:push/>
   </p:transition>
   <p:timing>
     <p:tnLst>
       <p:par>
-        <p:cTn xmlns:p14="http://schemas.microsoft.com/office/powerpoint/2010/main" id="1" dur="indefinite" restart="never" nodeType="tmRoot"/>
+        <p:cTn id="1" dur="indefinite" restart="never" nodeType="tmRoot"/>
       </p:par>
     </p:tnLst>
   </p:timing>
@@ -2333,13 +2377,13 @@
   <p:clrMapOvr>
     <a:masterClrMapping/>
   </p:clrMapOvr>
-  <p:transition xmlns:p14="http://schemas.microsoft.com/office/powerpoint/2010/main" spd="slow">
+  <p:transition spd="slow">
     <p:push/>
   </p:transition>
   <p:timing>
     <p:tnLst>
       <p:par>
-        <p:cTn xmlns:p14="http://schemas.microsoft.com/office/powerpoint/2010/main" id="1" dur="indefinite" restart="never" nodeType="tmRoot"/>
+        <p:cTn id="1" dur="indefinite" restart="never" nodeType="tmRoot"/>
       </p:par>
     </p:tnLst>
   </p:timing>
@@ -2539,13 +2583,13 @@
   <p:clrMapOvr>
     <a:masterClrMapping/>
   </p:clrMapOvr>
-  <p:transition xmlns:p14="http://schemas.microsoft.com/office/powerpoint/2010/main" spd="slow">
+  <p:transition spd="slow">
     <p:push/>
   </p:transition>
   <p:timing>
     <p:tnLst>
       <p:par>
-        <p:cTn xmlns:p14="http://schemas.microsoft.com/office/powerpoint/2010/main" id="1" dur="indefinite" restart="never" nodeType="tmRoot"/>
+        <p:cTn id="1" dur="indefinite" restart="never" nodeType="tmRoot"/>
       </p:par>
     </p:tnLst>
   </p:timing>
@@ -2810,13 +2854,13 @@
   <p:clrMapOvr>
     <a:masterClrMapping/>
   </p:clrMapOvr>
-  <p:transition xmlns:p14="http://schemas.microsoft.com/office/powerpoint/2010/main" spd="slow">
+  <p:transition spd="slow">
     <p:push/>
   </p:transition>
   <p:timing>
     <p:tnLst>
       <p:par>
-        <p:cTn xmlns:p14="http://schemas.microsoft.com/office/powerpoint/2010/main" id="1" dur="indefinite" restart="never" nodeType="tmRoot"/>
+        <p:cTn id="1" dur="indefinite" restart="never" nodeType="tmRoot"/>
       </p:par>
     </p:tnLst>
   </p:timing>
@@ -2873,13 +2917,13 @@
   <p:clrMapOvr>
     <a:masterClrMapping/>
   </p:clrMapOvr>
-  <p:transition xmlns:p14="http://schemas.microsoft.com/office/powerpoint/2010/main" spd="slow">
+  <p:transition spd="slow">
     <p:push/>
   </p:transition>
   <p:timing>
     <p:tnLst>
       <p:par>
-        <p:cTn xmlns:p14="http://schemas.microsoft.com/office/powerpoint/2010/main" id="1" dur="indefinite" restart="never" nodeType="tmRoot"/>
+        <p:cTn id="1" dur="indefinite" restart="never" nodeType="tmRoot"/>
       </p:par>
     </p:tnLst>
   </p:timing>
@@ -3040,13 +3084,13 @@
   <p:clrMapOvr>
     <a:masterClrMapping/>
   </p:clrMapOvr>
-  <p:transition xmlns:p14="http://schemas.microsoft.com/office/powerpoint/2010/main" spd="slow">
+  <p:transition spd="slow">
     <p:push/>
   </p:transition>
   <p:timing>
     <p:tnLst>
       <p:par>
-        <p:cTn xmlns:p14="http://schemas.microsoft.com/office/powerpoint/2010/main" id="1" dur="indefinite" restart="never" nodeType="tmRoot"/>
+        <p:cTn id="1" dur="indefinite" restart="never" nodeType="tmRoot"/>
       </p:par>
     </p:tnLst>
   </p:timing>
@@ -3284,13 +3328,13 @@
   <p:clrMapOvr>
     <a:masterClrMapping/>
   </p:clrMapOvr>
-  <p:transition xmlns:p14="http://schemas.microsoft.com/office/powerpoint/2010/main" spd="slow">
+  <p:transition spd="slow">
     <p:push/>
   </p:transition>
   <p:timing>
     <p:tnLst>
       <p:par>
-        <p:cTn xmlns:p14="http://schemas.microsoft.com/office/powerpoint/2010/main" id="1" dur="indefinite" restart="never" nodeType="tmRoot"/>
+        <p:cTn id="1" dur="indefinite" restart="never" nodeType="tmRoot"/>
       </p:par>
     </p:tnLst>
   </p:timing>
@@ -3429,13 +3473,13 @@
   <p:clrMapOvr>
     <a:masterClrMapping/>
   </p:clrMapOvr>
-  <p:transition xmlns:p14="http://schemas.microsoft.com/office/powerpoint/2010/main" spd="slow">
+  <p:transition spd="slow">
     <p:push/>
   </p:transition>
   <p:timing>
     <p:tnLst>
       <p:par>
-        <p:cTn xmlns:p14="http://schemas.microsoft.com/office/powerpoint/2010/main" id="1" dur="indefinite" restart="never" nodeType="tmRoot"/>
+        <p:cTn id="1" dur="indefinite" restart="never" nodeType="tmRoot"/>
       </p:par>
     </p:tnLst>
   </p:timing>
@@ -3667,13 +3711,13 @@
   <p:clrMapOvr>
     <a:masterClrMapping/>
   </p:clrMapOvr>
-  <p:transition xmlns:p14="http://schemas.microsoft.com/office/powerpoint/2010/main" spd="slow">
+  <p:transition spd="slow">
     <p:push/>
   </p:transition>
   <p:timing>
     <p:tnLst>
       <p:par>
-        <p:cTn xmlns:p14="http://schemas.microsoft.com/office/powerpoint/2010/main" id="1" dur="indefinite" restart="never" nodeType="tmRoot"/>
+        <p:cTn id="1" dur="indefinite" restart="never" nodeType="tmRoot"/>
       </p:par>
     </p:tnLst>
   </p:timing>
@@ -3921,13 +3965,13 @@
   <p:clrMapOvr>
     <a:masterClrMapping/>
   </p:clrMapOvr>
-  <p:transition xmlns:p14="http://schemas.microsoft.com/office/powerpoint/2010/main" spd="slow">
+  <p:transition spd="slow">
     <p:push/>
   </p:transition>
   <p:timing>
     <p:tnLst>
       <p:par>
-        <p:cTn xmlns:p14="http://schemas.microsoft.com/office/powerpoint/2010/main" id="1" dur="indefinite" restart="never" nodeType="tmRoot"/>
+        <p:cTn id="1" dur="indefinite" restart="never" nodeType="tmRoot"/>
       </p:par>
     </p:tnLst>
   </p:timing>
@@ -4316,13 +4360,13 @@
   <p:clrMapOvr>
     <a:masterClrMapping/>
   </p:clrMapOvr>
-  <p:transition xmlns:p14="http://schemas.microsoft.com/office/powerpoint/2010/main" spd="slow">
+  <p:transition spd="slow">
     <p:push/>
   </p:transition>
   <p:timing>
     <p:tnLst>
       <p:par>
-        <p:cTn xmlns:p14="http://schemas.microsoft.com/office/powerpoint/2010/main" id="1" dur="indefinite" restart="never" nodeType="tmRoot"/>
+        <p:cTn id="1" dur="indefinite" restart="never" nodeType="tmRoot"/>
       </p:par>
     </p:tnLst>
   </p:timing>
@@ -4547,13 +4591,13 @@
     <p:sldLayoutId id="2147483655" r:id="rId10"/>
     <p:sldLayoutId id="2147483657" r:id="rId11"/>
   </p:sldLayoutIdLst>
-  <p:transition xmlns:p14="http://schemas.microsoft.com/office/powerpoint/2010/main" spd="slow">
+  <p:transition spd="slow">
     <p:push/>
   </p:transition>
   <p:timing>
     <p:tnLst>
       <p:par>
-        <p:cTn xmlns:p14="http://schemas.microsoft.com/office/powerpoint/2010/main" id="1" dur="indefinite" restart="never" nodeType="tmRoot"/>
+        <p:cTn id="1" dur="indefinite" restart="never" nodeType="tmRoot"/>
       </p:par>
     </p:tnLst>
   </p:timing>
@@ -4854,7 +4898,7 @@
           <a:p>
             <a:r>
               <a:rPr lang="hr-HR" sz="7200" dirty="0" err="1">
-                <a:latin typeface="Abril Text SemiBold"/>
+                <a:latin typeface="Abril Text EB" panose="02000503070000020004" pitchFamily="50" charset="0"/>
                 <a:cs typeface="Abril Text SemiBold"/>
               </a:rPr>
               <a:t>PostCSS</a:t>
@@ -4909,34 +4953,34 @@
           <a:p>
             <a:r>
               <a:rPr lang="en-US" sz="4000" dirty="0" smtClean="0">
-                <a:latin typeface="Abril Text SemiBold"/>
+                <a:latin typeface="+mn-lt"/>
                 <a:cs typeface="Abril Text SemiBold"/>
               </a:rPr>
               <a:t>in </a:t>
             </a:r>
             <a:r>
               <a:rPr lang="ta-IN" sz="4000" dirty="0" smtClean="0">
-                <a:latin typeface="Abril Text SemiBold"/>
+                <a:latin typeface="+mn-lt"/>
                 <a:cs typeface="Abril Text SemiBold"/>
               </a:rPr>
               <a:t>a </a:t>
             </a:r>
             <a:r>
               <a:rPr lang="en-US" sz="4000" dirty="0" smtClean="0">
-                <a:latin typeface="Abril Text SemiBold"/>
+                <a:latin typeface="+mn-lt"/>
                 <a:cs typeface="Abril Text SemiBold"/>
               </a:rPr>
               <a:t>real</a:t>
             </a:r>
             <a:r>
               <a:rPr lang="ta-IN" sz="4000" dirty="0" smtClean="0">
-                <a:latin typeface="Abril Text SemiBold"/>
+                <a:latin typeface="+mn-lt"/>
                 <a:cs typeface="Abril Text SemiBold"/>
               </a:rPr>
               <a:t> life</a:t>
             </a:r>
             <a:endParaRPr lang="hr-HR" sz="4000" dirty="0">
-              <a:latin typeface="Abril Text SemiBold"/>
+              <a:latin typeface="+mn-lt"/>
               <a:cs typeface="Abril Text SemiBold"/>
             </a:endParaRPr>
           </a:p>
@@ -4990,20 +5034,20 @@
             </a:pPr>
             <a:r>
               <a:rPr lang="en-US" sz="1400" dirty="0" smtClean="0">
-                <a:latin typeface="Theinhardt Rg"/>
+                <a:latin typeface="+mn-lt"/>
                 <a:cs typeface="Theinhardt Rg"/>
               </a:rPr>
               <a:t>Ivan Bašić @</a:t>
             </a:r>
             <a:r>
               <a:rPr lang="en-US" sz="1400" dirty="0" err="1" smtClean="0">
-                <a:latin typeface="Theinhardt Rg"/>
+                <a:latin typeface="+mn-lt"/>
                 <a:cs typeface="Theinhardt Rg"/>
               </a:rPr>
               <a:t>ivanronga</a:t>
             </a:r>
             <a:endParaRPr lang="en-US" sz="1400" dirty="0" smtClean="0">
-              <a:latin typeface="Theinhardt Rg"/>
+              <a:latin typeface="+mn-lt"/>
               <a:cs typeface="Theinhardt Rg"/>
             </a:endParaRPr>
           </a:p>
@@ -5018,20 +5062,20 @@
             </a:pPr>
             <a:r>
               <a:rPr lang="en-US" sz="1400" dirty="0" smtClean="0">
-                <a:latin typeface="Theinhardt Rg"/>
+                <a:latin typeface="+mn-lt"/>
                 <a:cs typeface="Theinhardt Rg"/>
               </a:rPr>
               <a:t>Mihael Tomić @</a:t>
             </a:r>
             <a:r>
               <a:rPr lang="en-US" sz="1400" dirty="0" err="1" smtClean="0">
-                <a:latin typeface="Theinhardt Rg"/>
+                <a:latin typeface="+mn-lt"/>
                 <a:cs typeface="Theinhardt Rg"/>
               </a:rPr>
               <a:t>tomic_mihael</a:t>
             </a:r>
             <a:endParaRPr lang="hr-HR" sz="1400" dirty="0">
-              <a:latin typeface="Theinhardt Rg"/>
+              <a:latin typeface="+mn-lt"/>
               <a:cs typeface="Theinhardt Rg"/>
             </a:endParaRPr>
           </a:p>
@@ -5047,13 +5091,13 @@
   <p:clrMapOvr>
     <a:masterClrMapping/>
   </p:clrMapOvr>
-  <p:transition xmlns:p14="http://schemas.microsoft.com/office/powerpoint/2010/main" spd="slow">
+  <p:transition spd="slow">
     <p:push/>
   </p:transition>
   <p:timing>
     <p:tnLst>
       <p:par>
-        <p:cTn xmlns:p14="http://schemas.microsoft.com/office/powerpoint/2010/main" id="1" dur="indefinite" restart="never" nodeType="tmRoot">
+        <p:cTn id="1" dur="indefinite" restart="never" nodeType="tmRoot">
           <p:childTnLst>
             <p:seq concurrent="1" nextAc="seek">
               <p:cTn id="2" dur="indefinite" nodeType="mainSeq">
@@ -5295,13 +5339,13 @@
   <p:clrMapOvr>
     <a:masterClrMapping/>
   </p:clrMapOvr>
-  <p:transition xmlns:p14="http://schemas.microsoft.com/office/powerpoint/2010/main" spd="slow">
+  <p:transition spd="slow">
     <p:push/>
   </p:transition>
   <p:timing>
     <p:tnLst>
       <p:par>
-        <p:cTn xmlns:p14="http://schemas.microsoft.com/office/powerpoint/2010/main" id="1" dur="indefinite" restart="never" nodeType="tmRoot"/>
+        <p:cTn id="1" dur="indefinite" restart="never" nodeType="tmRoot"/>
       </p:par>
     </p:tnLst>
   </p:timing>
@@ -5344,13 +5388,13 @@
           <a:p>
             <a:r>
               <a:rPr lang="en-US" sz="4000" dirty="0" smtClean="0">
-                <a:latin typeface="Abril Text SemiBold"/>
+                <a:latin typeface="+mj-lt"/>
                 <a:cs typeface="Abril Text SemiBold"/>
               </a:rPr>
               <a:t>What is PostCSS anyway?</a:t>
             </a:r>
             <a:endParaRPr lang="en-US" sz="4000" dirty="0">
-              <a:latin typeface="Abril Text SemiBold"/>
+              <a:latin typeface="+mj-lt"/>
               <a:cs typeface="Abril Text SemiBold"/>
             </a:endParaRPr>
           </a:p>
@@ -5375,49 +5419,49 @@
           <a:p>
             <a:r>
               <a:rPr lang="en-US" dirty="0">
-                <a:latin typeface="Theinhardt Rg"/>
+                <a:latin typeface="+mn-lt"/>
                 <a:cs typeface="Theinhardt Rg"/>
               </a:rPr>
               <a:t>PostCSS </a:t>
             </a:r>
             <a:r>
               <a:rPr lang="en-US" dirty="0" smtClean="0">
-                <a:latin typeface="Theinhardt Rg"/>
+                <a:latin typeface="+mn-lt"/>
                 <a:cs typeface="Theinhardt Rg"/>
               </a:rPr>
               <a:t>is</a:t>
             </a:r>
             <a:r>
               <a:rPr lang="hr-HR" dirty="0" smtClean="0">
-                <a:latin typeface="Theinhardt Rg"/>
+                <a:latin typeface="+mn-lt"/>
                 <a:cs typeface="Theinhardt Rg"/>
               </a:rPr>
               <a:t> a</a:t>
             </a:r>
             <a:r>
               <a:rPr lang="ta-IN" dirty="0" smtClean="0">
-                <a:latin typeface="Theinhardt Rg"/>
+                <a:latin typeface="+mn-lt"/>
                 <a:cs typeface="Theinhardt Rg"/>
               </a:rPr>
               <a:t> </a:t>
             </a:r>
             <a:r>
               <a:rPr lang="en-US" dirty="0" smtClean="0">
-                <a:latin typeface="Theinhardt Rg"/>
+                <a:latin typeface="+mn-lt"/>
                 <a:cs typeface="Theinhardt Rg"/>
               </a:rPr>
               <a:t>tool to </a:t>
             </a:r>
             <a:r>
               <a:rPr lang="en-US" dirty="0">
-                <a:latin typeface="Theinhardt Rg"/>
+                <a:latin typeface="+mn-lt"/>
                 <a:cs typeface="Theinhardt Rg"/>
               </a:rPr>
               <a:t>transform styles with JS plugins</a:t>
             </a:r>
             <a:r>
               <a:rPr lang="en-US" dirty="0" smtClean="0">
-                <a:latin typeface="Theinhardt Rg"/>
+                <a:latin typeface="+mn-lt"/>
                 <a:cs typeface="Theinhardt Rg"/>
               </a:rPr>
               <a:t>.</a:t>
@@ -5426,38 +5470,80 @@
           <a:p>
             <a:r>
               <a:rPr lang="en-US" dirty="0">
-                <a:latin typeface="Theinhardt Rg"/>
+                <a:latin typeface="+mn-lt"/>
                 <a:cs typeface="Theinhardt Rg"/>
               </a:rPr>
               <a:t>These plugins can support variables and mixins</a:t>
             </a:r>
             <a:r>
               <a:rPr lang="en-US" dirty="0" smtClean="0">
-                <a:latin typeface="Theinhardt Rg"/>
+                <a:latin typeface="+mn-lt"/>
                 <a:cs typeface="Theinhardt Rg"/>
               </a:rPr>
               <a:t>,</a:t>
             </a:r>
             <a:r>
               <a:rPr lang="ta-IN" dirty="0" smtClean="0">
-                <a:latin typeface="Theinhardt Rg"/>
+                <a:latin typeface="+mn-lt"/>
                 <a:cs typeface="Theinhardt Rg"/>
               </a:rPr>
               <a:t> </a:t>
             </a:r>
             <a:r>
               <a:rPr lang="en-US" dirty="0" smtClean="0">
-                <a:latin typeface="Theinhardt Rg"/>
+                <a:latin typeface="+mn-lt"/>
                 <a:cs typeface="Theinhardt Rg"/>
               </a:rPr>
               <a:t>transpile</a:t>
             </a:r>
             <a:r>
               <a:rPr lang="en-US" dirty="0">
-                <a:latin typeface="Theinhardt Rg"/>
+                <a:latin typeface="+mn-lt"/>
                 <a:cs typeface="Theinhardt Rg"/>
               </a:rPr>
-              <a:t> future CSS syntax, inline images, and more.</a:t>
+              <a:t> future CSS syntax, </a:t>
+            </a:r>
+            <a:r>
+              <a:rPr lang="en-US" dirty="0" smtClean="0">
+                <a:latin typeface="+mn-lt"/>
+                <a:cs typeface="Theinhardt Rg"/>
+              </a:rPr>
+              <a:t>nesting</a:t>
+            </a:r>
+            <a:r>
+              <a:rPr lang="hr-HR" dirty="0" smtClean="0">
+                <a:latin typeface="+mn-lt"/>
+                <a:cs typeface="Theinhardt Rg"/>
+              </a:rPr>
+              <a:t>, </a:t>
+            </a:r>
+            <a:r>
+              <a:rPr lang="hr-HR" dirty="0" smtClean="0">
+                <a:latin typeface="+mn-lt"/>
+                <a:cs typeface="Theinhardt Rg"/>
+              </a:rPr>
+              <a:t>minification</a:t>
+            </a:r>
+            <a:r>
+              <a:rPr lang="hr-HR" dirty="0" smtClean="0">
+                <a:latin typeface="+mn-lt"/>
+                <a:cs typeface="Theinhardt Rg"/>
+              </a:rPr>
+              <a:t>, </a:t>
+            </a:r>
+            <a:r>
+              <a:rPr lang="en-US" dirty="0" smtClean="0">
+                <a:latin typeface="+mn-lt"/>
+                <a:cs typeface="Theinhardt Rg"/>
+              </a:rPr>
+              <a:t>inline</a:t>
+            </a:r>
+            <a:r>
+              <a:rPr lang="en-US" dirty="0">
+                <a:latin typeface="+mn-lt"/>
+                <a:cs typeface="Theinhardt Rg"/>
+              </a:rPr>
+              <a:t> images, and more.</a:t>
             </a:r>
           </a:p>
         </p:txBody>
@@ -5472,13 +5558,13 @@
   <p:clrMapOvr>
     <a:masterClrMapping/>
   </p:clrMapOvr>
-  <p:transition xmlns:p14="http://schemas.microsoft.com/office/powerpoint/2010/main" spd="slow">
+  <p:transition spd="slow">
     <p:push/>
   </p:transition>
   <p:timing>
     <p:tnLst>
       <p:par>
-        <p:cTn xmlns:p14="http://schemas.microsoft.com/office/powerpoint/2010/main" id="1" dur="indefinite" restart="never" nodeType="tmRoot"/>
+        <p:cTn id="1" dur="indefinite" restart="never" nodeType="tmRoot"/>
       </p:par>
     </p:tnLst>
   </p:timing>
@@ -5511,7 +5597,7 @@
         <p:spPr>
           <a:xfrm>
             <a:off x="-252536" y="-1028650"/>
-            <a:ext cx="2334972" cy="6447919"/>
+            <a:ext cx="1947969" cy="6447919"/>
           </a:xfrm>
           <a:prstGeom prst="rect">
             <a:avLst/>
@@ -5531,7 +5617,7 @@
                     <a:alpha val="14000"/>
                   </a:schemeClr>
                 </a:solidFill>
-                <a:latin typeface="Abril Text Bold"/>
+                <a:latin typeface="+mj-lt"/>
                 <a:cs typeface="Abril Text Bold"/>
               </a:rPr>
               <a:t>“</a:t>
@@ -5542,7 +5628,7 @@
                   <a:alpha val="14000"/>
                 </a:schemeClr>
               </a:solidFill>
-              <a:latin typeface="Abril Text Bold"/>
+              <a:latin typeface="+mj-lt"/>
               <a:cs typeface="Abril Text Bold"/>
             </a:endParaRPr>
           </a:p>
@@ -5577,20 +5663,20 @@
             </a:pPr>
             <a:r>
               <a:rPr lang="en-US" sz="4000" b="1" i="1" dirty="0">
-                <a:latin typeface="Abril Text Bold"/>
+                <a:latin typeface="+mj-lt"/>
                 <a:cs typeface="Abril Text Bold"/>
               </a:rPr>
               <a:t>It's not post-processing if it happens before hitting the browser</a:t>
             </a:r>
             <a:r>
               <a:rPr lang="en-US" sz="4000" b="1" i="1" dirty="0" smtClean="0">
-                <a:latin typeface="Abril Text Bold"/>
+                <a:latin typeface="+mj-lt"/>
                 <a:cs typeface="Abril Text Bold"/>
               </a:rPr>
               <a:t>.</a:t>
             </a:r>
             <a:endParaRPr lang="en-US" sz="4000" b="1" i="1" dirty="0">
-              <a:latin typeface="Abril Text Bold"/>
+              <a:latin typeface="+mj-lt"/>
               <a:cs typeface="Abril Text Bold"/>
             </a:endParaRPr>
           </a:p>
@@ -5620,28 +5706,28 @@
           <a:p>
             <a:r>
               <a:rPr lang="ta-IN" sz="2400" dirty="0" smtClean="0">
-                <a:latin typeface="Theinhardt Rg"/>
+                <a:latin typeface="+mn-lt"/>
                 <a:cs typeface="Theinhardt Rg"/>
               </a:rPr>
               <a:t>- </a:t>
             </a:r>
             <a:r>
               <a:rPr lang="en-US" sz="2400" dirty="0" smtClean="0">
-                <a:latin typeface="Theinhardt Rg"/>
+                <a:latin typeface="+mn-lt"/>
                 <a:cs typeface="Theinhardt Rg"/>
               </a:rPr>
               <a:t>Hugo </a:t>
             </a:r>
             <a:r>
-              <a:rPr lang="en-US" sz="2400" dirty="0" err="1">
-                <a:latin typeface="Theinhardt Rg"/>
+              <a:rPr lang="en-US" sz="2400" dirty="0">
+                <a:latin typeface="+mn-lt"/>
                 <a:cs typeface="Theinhardt Rg"/>
               </a:rPr>
               <a:t>Giraudel</a:t>
             </a:r>
             <a:r>
               <a:rPr lang="en-US" sz="2400" dirty="0">
-                <a:latin typeface="Theinhardt Rg"/>
+                <a:latin typeface="+mn-lt"/>
                 <a:cs typeface="Theinhardt Rg"/>
               </a:rPr>
               <a:t> </a:t>
@@ -5659,13 +5745,13 @@
   <p:clrMapOvr>
     <a:masterClrMapping/>
   </p:clrMapOvr>
-  <p:transition xmlns:p14="http://schemas.microsoft.com/office/powerpoint/2010/main" spd="slow">
+  <p:transition spd="slow">
     <p:push/>
   </p:transition>
   <p:timing>
     <p:tnLst>
       <p:par>
-        <p:cTn xmlns:p14="http://schemas.microsoft.com/office/powerpoint/2010/main" id="1" dur="indefinite" restart="never" nodeType="tmRoot"/>
+        <p:cTn id="1" dur="indefinite" restart="never" nodeType="tmRoot"/>
       </p:par>
     </p:tnLst>
   </p:timing>
@@ -5708,13 +5794,13 @@
           <a:p>
             <a:r>
               <a:rPr lang="ta-IN" sz="4000" dirty="0" smtClean="0">
-                <a:latin typeface="Abril Text SemiBold"/>
+                <a:latin typeface="+mj-lt"/>
                 <a:cs typeface="Abril Text SemiBold"/>
               </a:rPr>
               <a:t>CSS Pre-processors</a:t>
             </a:r>
             <a:endParaRPr lang="en-US" sz="4000" dirty="0">
-              <a:latin typeface="Abril Text SemiBold"/>
+              <a:latin typeface="+mj-lt"/>
               <a:cs typeface="Abril Text SemiBold"/>
             </a:endParaRPr>
           </a:p>
@@ -5737,7 +5823,7 @@
           <a:p>
             <a:r>
               <a:rPr lang="ta-IN" dirty="0" smtClean="0">
-                <a:latin typeface="Theinhardt Rg"/>
+                <a:latin typeface="+mn-lt"/>
                 <a:cs typeface="Theinhardt Rg"/>
               </a:rPr>
               <a:t>+</a:t>
@@ -5750,14 +5836,14 @@
             </a:pPr>
             <a:r>
               <a:rPr lang="ta-IN" dirty="0">
-                <a:latin typeface="Theinhardt Rg"/>
+                <a:latin typeface="+mn-lt"/>
                 <a:cs typeface="Theinhardt Rg"/>
               </a:rPr>
               <a:t>S</a:t>
             </a:r>
             <a:r>
               <a:rPr lang="ta-IN" dirty="0" smtClean="0">
-                <a:latin typeface="Theinhardt Rg"/>
+                <a:latin typeface="+mn-lt"/>
                 <a:cs typeface="Theinhardt Rg"/>
               </a:rPr>
               <a:t>yntax is very clear.</a:t>
@@ -5769,20 +5855,20 @@
               <a:buChar char="•"/>
             </a:pPr>
             <a:endParaRPr lang="ta-IN" dirty="0" smtClean="0">
-              <a:latin typeface="Theinhardt Rg"/>
+              <a:latin typeface="+mn-lt"/>
               <a:cs typeface="Theinhardt Rg"/>
             </a:endParaRPr>
           </a:p>
           <a:p>
             <a:r>
               <a:rPr lang="ta-IN" dirty="0" smtClean="0">
-                <a:latin typeface="Theinhardt Rg"/>
+                <a:latin typeface="+mn-lt"/>
                 <a:cs typeface="Theinhardt Rg"/>
               </a:rPr>
               <a:t>-</a:t>
             </a:r>
             <a:endParaRPr lang="ta-IN" dirty="0">
-              <a:latin typeface="Theinhardt Rg"/>
+              <a:latin typeface="+mn-lt"/>
               <a:cs typeface="Theinhardt Rg"/>
             </a:endParaRPr>
           </a:p>
@@ -5793,21 +5879,21 @@
             </a:pPr>
             <a:r>
               <a:rPr lang="ta-IN" dirty="0">
-                <a:latin typeface="Theinhardt Rg"/>
+                <a:latin typeface="+mn-lt"/>
                 <a:cs typeface="Theinhardt Rg"/>
               </a:rPr>
               <a:t>Large systems with </a:t>
             </a:r>
             <a:r>
               <a:rPr lang="en-US" dirty="0">
-                <a:latin typeface="Theinhardt Rg"/>
+                <a:latin typeface="+mn-lt"/>
                 <a:cs typeface="Theinhardt Rg"/>
               </a:rPr>
               <a:t>monolithic architecture</a:t>
             </a:r>
             <a:r>
               <a:rPr lang="ta-IN" dirty="0">
-                <a:latin typeface="Theinhardt Rg"/>
+                <a:latin typeface="+mn-lt"/>
                 <a:cs typeface="Theinhardt Rg"/>
               </a:rPr>
               <a:t>.</a:t>
@@ -5820,7 +5906,7 @@
             </a:pPr>
             <a:r>
               <a:rPr lang="ta-IN" dirty="0">
-                <a:latin typeface="Theinhardt Rg"/>
+                <a:latin typeface="+mn-lt"/>
                 <a:cs typeface="Theinhardt Rg"/>
               </a:rPr>
               <a:t>Huge build setup.</a:t>
@@ -5828,7 +5914,7 @@
           </a:p>
           <a:p>
             <a:endParaRPr lang="en-US" dirty="0">
-              <a:latin typeface="Theinhardt Rg"/>
+              <a:latin typeface="+mn-lt"/>
               <a:cs typeface="Theinhardt Rg"/>
             </a:endParaRPr>
           </a:p>
@@ -5844,13 +5930,13 @@
   <p:clrMapOvr>
     <a:masterClrMapping/>
   </p:clrMapOvr>
-  <p:transition xmlns:p14="http://schemas.microsoft.com/office/powerpoint/2010/main" spd="slow">
+  <p:transition spd="slow">
     <p:push/>
   </p:transition>
   <p:timing>
     <p:tnLst>
       <p:par>
-        <p:cTn xmlns:p14="http://schemas.microsoft.com/office/powerpoint/2010/main" id="1" dur="indefinite" restart="never" nodeType="tmRoot"/>
+        <p:cTn id="1" dur="indefinite" restart="never" nodeType="tmRoot"/>
       </p:par>
     </p:tnLst>
   </p:timing>
@@ -5893,13 +5979,13 @@
           <a:p>
             <a:r>
               <a:rPr lang="ta-IN" sz="4000" dirty="0" smtClean="0">
-                <a:latin typeface="Abril Text SemiBold"/>
+                <a:latin typeface="+mj-lt"/>
                 <a:cs typeface="Abril Text SemiBold"/>
               </a:rPr>
               <a:t>PostCSS</a:t>
             </a:r>
             <a:endParaRPr lang="en-US" sz="4000" dirty="0">
-              <a:latin typeface="Abril Text SemiBold"/>
+              <a:latin typeface="+mj-lt"/>
               <a:cs typeface="Abril Text SemiBold"/>
             </a:endParaRPr>
           </a:p>
@@ -5924,7 +6010,7 @@
           <a:p>
             <a:r>
               <a:rPr lang="ta-IN" dirty="0" smtClean="0">
-                <a:latin typeface="Theinhardt Rg"/>
+                <a:latin typeface="+mn-lt"/>
                 <a:cs typeface="Theinhardt Rg"/>
               </a:rPr>
               <a:t>+</a:t>
@@ -5937,21 +6023,21 @@
             </a:pPr>
             <a:r>
               <a:rPr lang="ta-IN" dirty="0" smtClean="0">
-                <a:latin typeface="Theinhardt Rg"/>
+                <a:latin typeface="+mn-lt"/>
                 <a:cs typeface="Theinhardt Rg"/>
               </a:rPr>
               <a:t>Modularity </a:t>
             </a:r>
             <a:r>
               <a:rPr lang="ta-IN" dirty="0">
-                <a:latin typeface="Theinhardt Rg"/>
+                <a:latin typeface="+mn-lt"/>
                 <a:cs typeface="Theinhardt Rg"/>
               </a:rPr>
               <a:t>– adding your own </a:t>
             </a:r>
             <a:r>
               <a:rPr lang="ta-IN" dirty="0" smtClean="0">
-                <a:latin typeface="Theinhardt Rg"/>
+                <a:latin typeface="+mn-lt"/>
                 <a:cs typeface="Theinhardt Rg"/>
               </a:rPr>
               <a:t>features.</a:t>
@@ -5964,7 +6050,7 @@
             </a:pPr>
             <a:r>
               <a:rPr lang="ta-IN" dirty="0" smtClean="0">
-                <a:latin typeface="Theinhardt Rg"/>
+                <a:latin typeface="+mn-lt"/>
                 <a:cs typeface="Theinhardt Rg"/>
               </a:rPr>
               <a:t>Awsome optimisation with pipeline.</a:t>
@@ -5977,7 +6063,7 @@
             </a:pPr>
             <a:r>
               <a:rPr lang="ta-IN" dirty="0" smtClean="0">
-                <a:latin typeface="Theinhardt Rg"/>
+                <a:latin typeface="+mn-lt"/>
                 <a:cs typeface="Theinhardt Rg"/>
               </a:rPr>
               <a:t>Plugins ecosystem.</a:t>
@@ -5985,14 +6071,14 @@
           </a:p>
           <a:p>
             <a:endParaRPr lang="ta-IN" dirty="0">
-              <a:latin typeface="Theinhardt Rg"/>
+              <a:latin typeface="+mn-lt"/>
               <a:cs typeface="Theinhardt Rg"/>
             </a:endParaRPr>
           </a:p>
           <a:p>
             <a:r>
               <a:rPr lang="ta-IN" dirty="0" smtClean="0">
-                <a:latin typeface="Theinhardt Rg"/>
+                <a:latin typeface="+mn-lt"/>
                 <a:cs typeface="Theinhardt Rg"/>
               </a:rPr>
               <a:t>-</a:t>
@@ -6005,13 +6091,13 @@
             </a:pPr>
             <a:r>
               <a:rPr lang="ta-IN" dirty="0" smtClean="0">
-                <a:latin typeface="Theinhardt Rg"/>
+                <a:latin typeface="+mn-lt"/>
                 <a:cs typeface="Theinhardt Rg"/>
               </a:rPr>
               <a:t>Tends to become a pre-processor.</a:t>
             </a:r>
             <a:endParaRPr lang="ta-IN" dirty="0">
-              <a:latin typeface="Theinhardt Rg"/>
+              <a:latin typeface="+mn-lt"/>
               <a:cs typeface="Theinhardt Rg"/>
             </a:endParaRPr>
           </a:p>
@@ -6027,13 +6113,13 @@
   <p:clrMapOvr>
     <a:masterClrMapping/>
   </p:clrMapOvr>
-  <p:transition xmlns:p14="http://schemas.microsoft.com/office/powerpoint/2010/main" spd="slow">
+  <p:transition spd="slow">
     <p:push/>
   </p:transition>
   <p:timing>
     <p:tnLst>
       <p:par>
-        <p:cTn xmlns:p14="http://schemas.microsoft.com/office/powerpoint/2010/main" id="1" dur="indefinite" restart="never" nodeType="tmRoot"/>
+        <p:cTn id="1" dur="indefinite" restart="never" nodeType="tmRoot"/>
       </p:par>
     </p:tnLst>
   </p:timing>
@@ -6076,13 +6162,13 @@
           <a:p>
             <a:r>
               <a:rPr lang="en-US" sz="4000" dirty="0" smtClean="0">
-                <a:latin typeface="Abril Text SemiBold"/>
+                <a:latin typeface="+mj-lt"/>
                 <a:cs typeface="Abril Text SemiBold"/>
               </a:rPr>
               <a:t>Performance</a:t>
             </a:r>
             <a:endParaRPr lang="en-US" dirty="0">
-              <a:latin typeface="Abril Text SemiBold"/>
+              <a:latin typeface="+mj-lt"/>
               <a:cs typeface="Abril Text SemiBold"/>
             </a:endParaRPr>
           </a:p>
@@ -6118,8 +6204,8 @@
         </p:nvSpPr>
         <p:spPr>
           <a:xfrm>
-            <a:off x="1597014" y="1661778"/>
-            <a:ext cx="684803" cy="307777"/>
+            <a:off x="1597014" y="1707654"/>
+            <a:ext cx="604653" cy="276999"/>
           </a:xfrm>
           <a:prstGeom prst="rect">
             <a:avLst/>
@@ -6133,30 +6219,27 @@
           <a:lstStyle/>
           <a:p>
             <a:r>
-              <a:rPr lang="en-US" sz="1400" dirty="0" smtClean="0">
+              <a:rPr lang="en-US" sz="1200" dirty="0" smtClean="0">
                 <a:solidFill>
                   <a:schemeClr val="bg1"/>
                 </a:solidFill>
-                <a:latin typeface="Theinhardt Rg"/>
                 <a:cs typeface="Theinhardt Rg"/>
               </a:rPr>
               <a:t>36 </a:t>
             </a:r>
             <a:r>
-              <a:rPr lang="en-US" sz="1400" dirty="0" err="1" smtClean="0">
+              <a:rPr lang="en-US" sz="1200" dirty="0" err="1" smtClean="0">
                 <a:solidFill>
                   <a:schemeClr val="bg1"/>
                 </a:solidFill>
-                <a:latin typeface="Theinhardt Rg"/>
                 <a:cs typeface="Theinhardt Rg"/>
               </a:rPr>
               <a:t>ms</a:t>
             </a:r>
-            <a:endParaRPr lang="en-US" sz="1400" dirty="0">
+            <a:endParaRPr lang="en-US" sz="1200" dirty="0">
               <a:solidFill>
                 <a:schemeClr val="bg1"/>
               </a:solidFill>
-              <a:latin typeface="Theinhardt Rg"/>
               <a:cs typeface="Theinhardt Rg"/>
             </a:endParaRPr>
           </a:p>
@@ -6170,8 +6253,8 @@
         </p:nvSpPr>
         <p:spPr>
           <a:xfrm>
-            <a:off x="2029061" y="2091651"/>
-            <a:ext cx="787395" cy="307777"/>
+            <a:off x="2029061" y="2137527"/>
+            <a:ext cx="696024" cy="276999"/>
           </a:xfrm>
           <a:prstGeom prst="rect">
             <a:avLst/>
@@ -6185,30 +6268,27 @@
           <a:lstStyle/>
           <a:p>
             <a:r>
-              <a:rPr lang="en-US" sz="1400" dirty="0" smtClean="0">
+              <a:rPr lang="en-US" sz="1200" dirty="0" smtClean="0">
                 <a:solidFill>
                   <a:schemeClr val="bg1"/>
                 </a:solidFill>
-                <a:latin typeface="Theinhardt Rg"/>
                 <a:cs typeface="Theinhardt Rg"/>
               </a:rPr>
               <a:t>136 </a:t>
             </a:r>
             <a:r>
-              <a:rPr lang="en-US" sz="1400" dirty="0" err="1" smtClean="0">
+              <a:rPr lang="en-US" sz="1200" dirty="0" err="1" smtClean="0">
                 <a:solidFill>
                   <a:schemeClr val="bg1"/>
                 </a:solidFill>
-                <a:latin typeface="Theinhardt Rg"/>
                 <a:cs typeface="Theinhardt Rg"/>
               </a:rPr>
               <a:t>ms</a:t>
             </a:r>
-            <a:endParaRPr lang="en-US" sz="1400" dirty="0">
+            <a:endParaRPr lang="en-US" sz="1200" dirty="0">
               <a:solidFill>
                 <a:schemeClr val="bg1"/>
               </a:solidFill>
-              <a:latin typeface="Theinhardt Rg"/>
               <a:cs typeface="Theinhardt Rg"/>
             </a:endParaRPr>
           </a:p>
@@ -6222,8 +6302,8 @@
         </p:nvSpPr>
         <p:spPr>
           <a:xfrm>
-            <a:off x="2101077" y="2657842"/>
-            <a:ext cx="787395" cy="307777"/>
+            <a:off x="2101077" y="2703718"/>
+            <a:ext cx="696024" cy="276999"/>
           </a:xfrm>
           <a:prstGeom prst="rect">
             <a:avLst/>
@@ -6237,30 +6317,27 @@
           <a:lstStyle/>
           <a:p>
             <a:r>
-              <a:rPr lang="en-US" sz="1400" dirty="0" smtClean="0">
+              <a:rPr lang="en-US" sz="1200" dirty="0" smtClean="0">
                 <a:solidFill>
                   <a:schemeClr val="bg1"/>
                 </a:solidFill>
-                <a:latin typeface="Theinhardt Rg"/>
                 <a:cs typeface="Theinhardt Rg"/>
               </a:rPr>
               <a:t>160 </a:t>
             </a:r>
             <a:r>
-              <a:rPr lang="en-US" sz="1400" dirty="0" err="1" smtClean="0">
+              <a:rPr lang="en-US" sz="1200" dirty="0" err="1" smtClean="0">
                 <a:solidFill>
                   <a:schemeClr val="bg1"/>
                 </a:solidFill>
-                <a:latin typeface="Theinhardt Rg"/>
                 <a:cs typeface="Theinhardt Rg"/>
               </a:rPr>
               <a:t>ms</a:t>
             </a:r>
-            <a:endParaRPr lang="en-US" sz="1400" dirty="0">
+            <a:endParaRPr lang="en-US" sz="1200" dirty="0">
               <a:solidFill>
                 <a:schemeClr val="bg1"/>
               </a:solidFill>
-              <a:latin typeface="Theinhardt Rg"/>
               <a:cs typeface="Theinhardt Rg"/>
             </a:endParaRPr>
           </a:p>
@@ -6274,8 +6351,8 @@
         </p:nvSpPr>
         <p:spPr>
           <a:xfrm>
-            <a:off x="2173064" y="3215461"/>
-            <a:ext cx="787395" cy="307777"/>
+            <a:off x="2173064" y="3261337"/>
+            <a:ext cx="696024" cy="276999"/>
           </a:xfrm>
           <a:prstGeom prst="rect">
             <a:avLst/>
@@ -6289,30 +6366,27 @@
           <a:lstStyle/>
           <a:p>
             <a:r>
-              <a:rPr lang="en-US" sz="1400" dirty="0" smtClean="0">
+              <a:rPr lang="en-US" sz="1200" dirty="0" smtClean="0">
                 <a:solidFill>
                   <a:schemeClr val="bg1"/>
                 </a:solidFill>
-                <a:latin typeface="Theinhardt Rg"/>
                 <a:cs typeface="Theinhardt Rg"/>
               </a:rPr>
               <a:t>167 </a:t>
             </a:r>
             <a:r>
-              <a:rPr lang="en-US" sz="1400" dirty="0" err="1" smtClean="0">
+              <a:rPr lang="en-US" sz="1200" dirty="0" err="1" smtClean="0">
                 <a:solidFill>
                   <a:schemeClr val="bg1"/>
                 </a:solidFill>
-                <a:latin typeface="Theinhardt Rg"/>
                 <a:cs typeface="Theinhardt Rg"/>
               </a:rPr>
               <a:t>ms</a:t>
             </a:r>
-            <a:endParaRPr lang="en-US" sz="1400" dirty="0">
+            <a:endParaRPr lang="en-US" sz="1200" dirty="0">
               <a:solidFill>
                 <a:schemeClr val="bg1"/>
               </a:solidFill>
-              <a:latin typeface="Theinhardt Rg"/>
               <a:cs typeface="Theinhardt Rg"/>
             </a:endParaRPr>
           </a:p>
@@ -6326,8 +6400,8 @@
         </p:nvSpPr>
         <p:spPr>
           <a:xfrm>
-            <a:off x="5424760" y="3795898"/>
-            <a:ext cx="889987" cy="307777"/>
+            <a:off x="5424760" y="3841774"/>
+            <a:ext cx="787395" cy="276999"/>
           </a:xfrm>
           <a:prstGeom prst="rect">
             <a:avLst/>
@@ -6341,30 +6415,27 @@
           <a:lstStyle/>
           <a:p>
             <a:r>
-              <a:rPr lang="en-US" sz="1400" dirty="0" smtClean="0">
+              <a:rPr lang="en-US" sz="1200" dirty="0" smtClean="0">
                 <a:solidFill>
                   <a:schemeClr val="bg1"/>
                 </a:solidFill>
-                <a:latin typeface="Theinhardt Rg"/>
                 <a:cs typeface="Theinhardt Rg"/>
               </a:rPr>
               <a:t>1084 </a:t>
             </a:r>
             <a:r>
-              <a:rPr lang="en-US" sz="1400" dirty="0" err="1" smtClean="0">
+              <a:rPr lang="en-US" sz="1200" dirty="0" err="1" smtClean="0">
                 <a:solidFill>
                   <a:schemeClr val="bg1"/>
                 </a:solidFill>
-                <a:latin typeface="Theinhardt Rg"/>
                 <a:cs typeface="Theinhardt Rg"/>
               </a:rPr>
               <a:t>ms</a:t>
             </a:r>
-            <a:endParaRPr lang="en-US" sz="1400" dirty="0">
+            <a:endParaRPr lang="en-US" sz="1200" dirty="0">
               <a:solidFill>
                 <a:schemeClr val="bg1"/>
               </a:solidFill>
-              <a:latin typeface="Theinhardt Rg"/>
               <a:cs typeface="Theinhardt Rg"/>
             </a:endParaRPr>
           </a:p>
@@ -6378,8 +6449,8 @@
         </p:nvSpPr>
         <p:spPr>
           <a:xfrm>
-            <a:off x="607775" y="4304154"/>
-            <a:ext cx="2800767" cy="307777"/>
+            <a:off x="607775" y="4382983"/>
+            <a:ext cx="2421176" cy="276999"/>
           </a:xfrm>
           <a:prstGeom prst="rect">
             <a:avLst/>
@@ -6393,35 +6464,31 @@
           <a:lstStyle/>
           <a:p>
             <a:r>
-              <a:rPr lang="en-US" sz="1400" dirty="0" smtClean="0">
+              <a:rPr lang="en-US" sz="1200" dirty="0" smtClean="0">
                 <a:solidFill>
                   <a:schemeClr val="bg1"/>
                 </a:solidFill>
-                <a:latin typeface="Theinhardt Rg"/>
                 <a:cs typeface="Theinhardt Rg"/>
               </a:rPr>
               <a:t>Source</a:t>
             </a:r>
             <a:r>
-              <a:rPr lang="en-US" sz="1400" dirty="0" smtClean="0">
+              <a:rPr lang="en-US" sz="1200" dirty="0" smtClean="0">
                 <a:noFill/>
-                <a:latin typeface="Theinhardt Rg"/>
                 <a:cs typeface="Theinhardt Rg"/>
               </a:rPr>
               <a:t>: </a:t>
             </a:r>
             <a:r>
-              <a:rPr lang="en-US" sz="1400" dirty="0" smtClean="0">
+              <a:rPr lang="en-US" sz="1200" dirty="0" smtClean="0">
                 <a:noFill/>
-                <a:latin typeface="Theinhardt Rg"/>
                 <a:cs typeface="Theinhardt Rg"/>
                 <a:hlinkClick r:id="rId5"/>
               </a:rPr>
               <a:t>Preprocessors benchmark</a:t>
             </a:r>
-            <a:endParaRPr lang="en-US" sz="1400" dirty="0">
+            <a:endParaRPr lang="en-US" sz="1200" dirty="0">
               <a:noFill/>
-              <a:latin typeface="Theinhardt Rg"/>
               <a:cs typeface="Theinhardt Rg"/>
             </a:endParaRPr>
           </a:p>
@@ -6527,13 +6594,13 @@
   <p:clrMapOvr>
     <a:masterClrMapping/>
   </p:clrMapOvr>
-  <p:transition xmlns:p14="http://schemas.microsoft.com/office/powerpoint/2010/main" spd="slow">
+  <p:transition spd="slow">
     <p:push/>
   </p:transition>
   <p:timing>
     <p:tnLst>
       <p:par>
-        <p:cTn xmlns:p14="http://schemas.microsoft.com/office/powerpoint/2010/main" id="1" dur="indefinite" restart="never" nodeType="tmRoot">
+        <p:cTn id="1" dur="indefinite" restart="never" nodeType="tmRoot">
           <p:childTnLst>
             <p:seq concurrent="1" nextAc="seek">
               <p:cTn id="2" dur="indefinite" nodeType="mainSeq">
@@ -6796,13 +6863,13 @@
           <a:p>
             <a:r>
               <a:rPr lang="ta-IN" sz="4000" dirty="0" smtClean="0">
-                <a:latin typeface="Abril Text SemiBold"/>
+                <a:latin typeface="+mj-lt"/>
                 <a:cs typeface="Abril Text SemiBold"/>
               </a:rPr>
               <a:t>Tools</a:t>
             </a:r>
             <a:endParaRPr lang="en-US" sz="4000" dirty="0">
-              <a:latin typeface="Abril Text SemiBold"/>
+              <a:latin typeface="+mj-lt"/>
               <a:cs typeface="Abril Text SemiBold"/>
             </a:endParaRPr>
           </a:p>
@@ -6831,13 +6898,13 @@
             </a:pPr>
             <a:r>
               <a:rPr lang="en-US" dirty="0" err="1" smtClean="0">
-                <a:latin typeface="Theinhardt Rg"/>
+                <a:latin typeface="+mn-lt"/>
                 <a:cs typeface="Theinhardt Rg"/>
               </a:rPr>
               <a:t>Node.js</a:t>
             </a:r>
             <a:endParaRPr lang="ta-IN" dirty="0" smtClean="0">
-              <a:latin typeface="Theinhardt Rg"/>
+              <a:latin typeface="+mn-lt"/>
               <a:cs typeface="Theinhardt Rg"/>
             </a:endParaRPr>
           </a:p>
@@ -6848,13 +6915,13 @@
             </a:pPr>
             <a:r>
               <a:rPr lang="ta-IN" dirty="0" smtClean="0">
-                <a:latin typeface="Theinhardt Rg"/>
+                <a:latin typeface="+mn-lt"/>
                 <a:cs typeface="Theinhardt Rg"/>
               </a:rPr>
               <a:t>Gulp.js</a:t>
             </a:r>
             <a:endParaRPr lang="en-US" dirty="0" smtClean="0">
-              <a:latin typeface="Theinhardt Rg"/>
+              <a:latin typeface="+mn-lt"/>
               <a:cs typeface="Theinhardt Rg"/>
             </a:endParaRPr>
           </a:p>
@@ -6865,29 +6932,18 @@
             </a:pPr>
             <a:r>
               <a:rPr lang="en-US" dirty="0" err="1" smtClean="0">
-                <a:latin typeface="Theinhardt Rg"/>
+                <a:latin typeface="+mn-lt"/>
                 <a:cs typeface="Theinhardt Rg"/>
               </a:rPr>
               <a:t>npm</a:t>
             </a:r>
             <a:r>
               <a:rPr lang="en-US" dirty="0" smtClean="0">
-                <a:latin typeface="Theinhardt Rg"/>
+                <a:latin typeface="+mn-lt"/>
                 <a:cs typeface="Theinhardt Rg"/>
               </a:rPr>
-              <a:t> (node package manager</a:t>
-            </a:r>
-            <a:r>
-              <a:rPr lang="en-US" dirty="0" smtClean="0">
-                <a:latin typeface="Theinhardt Rg"/>
-                <a:cs typeface="Theinhardt Rg"/>
-              </a:rPr>
-              <a:t>)</a:t>
-            </a:r>
-            <a:endParaRPr lang="en-US" dirty="0" smtClean="0">
-              <a:latin typeface="Theinhardt Rg"/>
-              <a:cs typeface="Theinhardt Rg"/>
-            </a:endParaRPr>
+              <a:t> (node package manager)</a:t>
+            </a:r>
           </a:p>
           <a:p>
             <a:pPr marL="457200" indent="-457200">
@@ -6896,13 +6952,13 @@
             </a:pPr>
             <a:r>
               <a:rPr lang="en-US" dirty="0" smtClean="0">
-                <a:latin typeface="Theinhardt Rg"/>
+                <a:latin typeface="+mn-lt"/>
                 <a:cs typeface="Theinhardt Rg"/>
               </a:rPr>
               <a:t>CSS</a:t>
             </a:r>
             <a:endParaRPr lang="en-US" dirty="0">
-              <a:latin typeface="Theinhardt Rg"/>
+              <a:latin typeface="+mn-lt"/>
               <a:cs typeface="Theinhardt Rg"/>
             </a:endParaRPr>
           </a:p>
@@ -6918,13 +6974,13 @@
   <p:clrMapOvr>
     <a:masterClrMapping/>
   </p:clrMapOvr>
-  <p:transition xmlns:p14="http://schemas.microsoft.com/office/powerpoint/2010/main" spd="slow">
+  <p:transition spd="slow">
     <p:push/>
   </p:transition>
   <p:timing>
     <p:tnLst>
       <p:par>
-        <p:cTn xmlns:p14="http://schemas.microsoft.com/office/powerpoint/2010/main" id="1" dur="indefinite" restart="never" nodeType="tmRoot"/>
+        <p:cTn id="1" dur="indefinite" restart="never" nodeType="tmRoot"/>
       </p:par>
     </p:tnLst>
   </p:timing>
@@ -6967,13 +7023,13 @@
           <a:p>
             <a:r>
               <a:rPr lang="en-US" sz="4000" dirty="0" smtClean="0">
-                <a:latin typeface="Abril Text SemiBold"/>
+                <a:latin typeface="+mj-lt"/>
                 <a:cs typeface="Abril Text SemiBold"/>
               </a:rPr>
               <a:t>Usage</a:t>
             </a:r>
             <a:endParaRPr lang="en-US" sz="4000" dirty="0">
-              <a:latin typeface="Abril Text SemiBold"/>
+              <a:latin typeface="+mj-lt"/>
               <a:cs typeface="Abril Text SemiBold"/>
             </a:endParaRPr>
           </a:p>
@@ -7002,7 +7058,7 @@
             </a:pPr>
             <a:r>
               <a:rPr lang="en-US" dirty="0">
-                <a:latin typeface="Theinhardt Rg"/>
+                <a:latin typeface="+mn-lt"/>
                 <a:cs typeface="Theinhardt Rg"/>
               </a:rPr>
               <a:t>Add PostCSS to your build tool.</a:t>
@@ -7015,34 +7071,34 @@
             </a:pPr>
             <a:r>
               <a:rPr lang="en-US" dirty="0">
-                <a:latin typeface="Theinhardt Rg"/>
+                <a:latin typeface="+mn-lt"/>
                 <a:cs typeface="Theinhardt Rg"/>
               </a:rPr>
               <a:t>Select plugins </a:t>
             </a:r>
             <a:r>
               <a:rPr lang="en-US" dirty="0" smtClean="0">
-                <a:latin typeface="Theinhardt Rg"/>
+                <a:latin typeface="+mn-lt"/>
                 <a:cs typeface="Theinhardt Rg"/>
               </a:rPr>
               <a:t>and </a:t>
             </a:r>
             <a:r>
               <a:rPr lang="en-US" dirty="0">
-                <a:latin typeface="Theinhardt Rg"/>
+                <a:latin typeface="+mn-lt"/>
                 <a:cs typeface="Theinhardt Rg"/>
               </a:rPr>
               <a:t>add them to your PostCSS process</a:t>
             </a:r>
             <a:r>
               <a:rPr lang="en-US" dirty="0" smtClean="0">
-                <a:latin typeface="Theinhardt Rg"/>
+                <a:latin typeface="+mn-lt"/>
                 <a:cs typeface="Theinhardt Rg"/>
               </a:rPr>
               <a:t>.</a:t>
             </a:r>
             <a:endParaRPr lang="ta-IN" dirty="0" smtClean="0">
-              <a:latin typeface="Theinhardt Rg"/>
+              <a:latin typeface="+mn-lt"/>
               <a:cs typeface="Theinhardt Rg"/>
             </a:endParaRPr>
           </a:p>
@@ -7053,7 +7109,7 @@
             </a:pPr>
             <a:r>
               <a:rPr lang="ta-IN" dirty="0" smtClean="0">
-                <a:latin typeface="Theinhardt Rg"/>
+                <a:latin typeface="+mn-lt"/>
                 <a:cs typeface="Theinhardt Rg"/>
               </a:rPr>
               <a:t>Setup gulp task and build your CSS.</a:t>
@@ -7061,34 +7117,27 @@
           </a:p>
           <a:p>
             <a:endParaRPr lang="ta-IN" dirty="0" smtClean="0">
-              <a:latin typeface="Theinhardt Rg"/>
+              <a:latin typeface="+mn-lt"/>
               <a:cs typeface="Theinhardt Rg"/>
             </a:endParaRPr>
           </a:p>
           <a:p>
             <a:r>
               <a:rPr lang="ta-IN" i="1" dirty="0" smtClean="0">
-                <a:latin typeface="Theinhardt Rg"/>
+                <a:latin typeface="+mn-lt"/>
                 <a:cs typeface="Theinhardt Rg"/>
               </a:rPr>
               <a:t>* </a:t>
             </a:r>
             <a:r>
               <a:rPr lang="en-US" i="1" dirty="0" smtClean="0">
-                <a:latin typeface="Theinhardt Rg"/>
+                <a:latin typeface="+mn-lt"/>
                 <a:cs typeface="Theinhardt Rg"/>
               </a:rPr>
-              <a:t>There </a:t>
-            </a:r>
-            <a:r>
-              <a:rPr lang="en-US" i="1" dirty="0" smtClean="0">
-                <a:latin typeface="Theinhardt Rg"/>
-                <a:cs typeface="Theinhardt Rg"/>
-              </a:rPr>
-              <a:t>are plugins for Grunt, Gulp, webpack, Broccoli, Brunch and ENB.</a:t>
+              <a:t>There are plugins for Grunt, Gulp, webpack, Broccoli, Brunch and ENB.</a:t>
             </a:r>
             <a:endParaRPr lang="en-US" i="1" dirty="0">
-              <a:latin typeface="Theinhardt Rg"/>
+              <a:latin typeface="+mn-lt"/>
               <a:cs typeface="Theinhardt Rg"/>
             </a:endParaRPr>
           </a:p>
@@ -7104,13 +7153,13 @@
   <p:clrMapOvr>
     <a:masterClrMapping/>
   </p:clrMapOvr>
-  <p:transition xmlns:p14="http://schemas.microsoft.com/office/powerpoint/2010/main" spd="slow">
+  <p:transition spd="slow">
     <p:push/>
   </p:transition>
   <p:timing>
     <p:tnLst>
       <p:par>
-        <p:cTn xmlns:p14="http://schemas.microsoft.com/office/powerpoint/2010/main" id="1" dur="indefinite" restart="never" nodeType="tmRoot"/>
+        <p:cTn id="1" dur="indefinite" restart="never" nodeType="tmRoot"/>
       </p:par>
     </p:tnLst>
   </p:timing>
@@ -7153,13 +7202,13 @@
           <a:p>
             <a:r>
               <a:rPr lang="hr-HR" sz="4000" dirty="0" err="1" smtClean="0">
-                <a:latin typeface="Abril Text SemiBold"/>
+                <a:latin typeface="+mj-lt"/>
                 <a:cs typeface="Abril Text SemiBold"/>
               </a:rPr>
               <a:t>Plugins</a:t>
             </a:r>
             <a:endParaRPr lang="en-US" sz="4000" dirty="0">
-              <a:latin typeface="Abril Text SemiBold"/>
+              <a:latin typeface="+mj-lt"/>
               <a:cs typeface="Abril Text SemiBold"/>
             </a:endParaRPr>
           </a:p>
@@ -7196,7 +7245,7 @@
             </a:pPr>
             <a:r>
               <a:rPr lang="ta-IN" dirty="0" smtClean="0">
-                <a:latin typeface="Theinhardt Rg"/>
+                <a:latin typeface="+mn-lt"/>
                 <a:cs typeface="Theinhardt Rg"/>
               </a:rPr>
               <a:t>Over 120 plugins; and growing.</a:t>
@@ -7212,7 +7261,7 @@
             </a:pPr>
             <a:r>
               <a:rPr lang="ta-IN" dirty="0" smtClean="0">
-                <a:latin typeface="Theinhardt Rg"/>
+                <a:latin typeface="+mn-lt"/>
                 <a:cs typeface="Theinhardt Rg"/>
               </a:rPr>
               <a:t>Small chunks of JS code:</a:t>
@@ -7245,7 +7294,14 @@
                 <a:latin typeface="Theinhardt Rg"/>
                 <a:cs typeface="Theinhardt Rg"/>
               </a:rPr>
-              <a:t>– 74 LOC</a:t>
+              <a:t>– </a:t>
+            </a:r>
+            <a:r>
+              <a:rPr lang="ta-IN" dirty="0" smtClean="0">
+                <a:latin typeface="+mn-lt"/>
+                <a:cs typeface="Theinhardt Rg"/>
+              </a:rPr>
+              <a:t>74 LOC</a:t>
             </a:r>
           </a:p>
           <a:p>
@@ -7282,7 +7338,14 @@
                 <a:latin typeface="Theinhardt Rg"/>
                 <a:cs typeface="Theinhardt Rg"/>
               </a:rPr>
-              <a:t> 68 LOC</a:t>
+              <a:t> </a:t>
+            </a:r>
+            <a:r>
+              <a:rPr lang="en-US" dirty="0" smtClean="0">
+                <a:latin typeface="+mn-lt"/>
+                <a:cs typeface="Theinhardt Rg"/>
+              </a:rPr>
+              <a:t>68 LOC</a:t>
             </a:r>
           </a:p>
           <a:p>
@@ -7337,7 +7400,7 @@
             </a:r>
             <a:r>
               <a:rPr lang="en-US" dirty="0">
-                <a:latin typeface="Theinhardt Rg"/>
+                <a:latin typeface="+mn-lt"/>
                 <a:cs typeface="Theinhardt Rg"/>
               </a:rPr>
               <a:t>147 LOC</a:t>
@@ -7366,7 +7429,7 @@
             </a:pPr>
             <a:r>
               <a:rPr lang="ta-IN" dirty="0" smtClean="0">
-                <a:latin typeface="Theinhardt Rg"/>
+                <a:latin typeface="+mn-lt"/>
                 <a:cs typeface="Theinhardt Rg"/>
               </a:rPr>
               <a:t>Maintainable code</a:t>
@@ -7397,13 +7460,13 @@
   <p:clrMapOvr>
     <a:masterClrMapping/>
   </p:clrMapOvr>
-  <p:transition xmlns:p14="http://schemas.microsoft.com/office/powerpoint/2010/main" spd="slow">
+  <p:transition spd="slow">
     <p:push/>
   </p:transition>
   <p:timing>
     <p:tnLst>
       <p:par>
-        <p:cTn xmlns:p14="http://schemas.microsoft.com/office/powerpoint/2010/main" id="1" dur="indefinite" restart="never" nodeType="tmRoot"/>
+        <p:cTn id="1" dur="indefinite" restart="never" nodeType="tmRoot"/>
       </p:par>
     </p:tnLst>
   </p:timing>
@@ -7457,76 +7520,16 @@
         <a:srgbClr val="800080"/>
       </a:folHlink>
     </a:clrScheme>
-    <a:fontScheme name="Office">
+    <a:fontScheme name="Mono">
       <a:majorFont>
-        <a:latin typeface="Calibri"/>
+        <a:latin typeface="Abril Text SB"/>
         <a:ea typeface=""/>
         <a:cs typeface=""/>
-        <a:font script="Jpan" typeface="ＭＳ Ｐゴシック"/>
-        <a:font script="Hang" typeface="맑은 고딕"/>
-        <a:font script="Hans" typeface="宋体"/>
-        <a:font script="Hant" typeface="新細明體"/>
-        <a:font script="Arab" typeface="Times New Roman"/>
-        <a:font script="Hebr" typeface="Times New Roman"/>
-        <a:font script="Thai" typeface="Angsana New"/>
-        <a:font script="Ethi" typeface="Nyala"/>
-        <a:font script="Beng" typeface="Vrinda"/>
-        <a:font script="Gujr" typeface="Shruti"/>
-        <a:font script="Khmr" typeface="MoolBoran"/>
-        <a:font script="Knda" typeface="Tunga"/>
-        <a:font script="Guru" typeface="Raavi"/>
-        <a:font script="Cans" typeface="Euphemia"/>
-        <a:font script="Cher" typeface="Plantagenet Cherokee"/>
-        <a:font script="Yiii" typeface="Microsoft Yi Baiti"/>
-        <a:font script="Tibt" typeface="Microsoft Himalaya"/>
-        <a:font script="Thaa" typeface="MV Boli"/>
-        <a:font script="Deva" typeface="Mangal"/>
-        <a:font script="Telu" typeface="Gautami"/>
-        <a:font script="Taml" typeface="Latha"/>
-        <a:font script="Syrc" typeface="Estrangelo Edessa"/>
-        <a:font script="Orya" typeface="Kalinga"/>
-        <a:font script="Mlym" typeface="Kartika"/>
-        <a:font script="Laoo" typeface="DokChampa"/>
-        <a:font script="Sinh" typeface="Iskoola Pota"/>
-        <a:font script="Mong" typeface="Mongolian Baiti"/>
-        <a:font script="Viet" typeface="Times New Roman"/>
-        <a:font script="Uigh" typeface="Microsoft Uighur"/>
-        <a:font script="Geor" typeface="Sylfaen"/>
       </a:majorFont>
       <a:minorFont>
-        <a:latin typeface="Calibri"/>
+        <a:latin typeface="Theinhardt"/>
         <a:ea typeface=""/>
         <a:cs typeface=""/>
-        <a:font script="Jpan" typeface="ＭＳ Ｐゴシック"/>
-        <a:font script="Hang" typeface="맑은 고딕"/>
-        <a:font script="Hans" typeface="宋体"/>
-        <a:font script="Hant" typeface="新細明體"/>
-        <a:font script="Arab" typeface="Arial"/>
-        <a:font script="Hebr" typeface="Arial"/>
-        <a:font script="Thai" typeface="Cordia New"/>
-        <a:font script="Ethi" typeface="Nyala"/>
-        <a:font script="Beng" typeface="Vrinda"/>
-        <a:font script="Gujr" typeface="Shruti"/>
-        <a:font script="Khmr" typeface="DaunPenh"/>
-        <a:font script="Knda" typeface="Tunga"/>
-        <a:font script="Guru" typeface="Raavi"/>
-        <a:font script="Cans" typeface="Euphemia"/>
-        <a:font script="Cher" typeface="Plantagenet Cherokee"/>
-        <a:font script="Yiii" typeface="Microsoft Yi Baiti"/>
-        <a:font script="Tibt" typeface="Microsoft Himalaya"/>
-        <a:font script="Thaa" typeface="MV Boli"/>
-        <a:font script="Deva" typeface="Mangal"/>
-        <a:font script="Telu" typeface="Gautami"/>
-        <a:font script="Taml" typeface="Latha"/>
-        <a:font script="Syrc" typeface="Estrangelo Edessa"/>
-        <a:font script="Orya" typeface="Kalinga"/>
-        <a:font script="Mlym" typeface="Kartika"/>
-        <a:font script="Laoo" typeface="DokChampa"/>
-        <a:font script="Sinh" typeface="Iskoola Pota"/>
-        <a:font script="Mong" typeface="Mongolian Baiti"/>
-        <a:font script="Viet" typeface="Arial"/>
-        <a:font script="Uigh" typeface="Microsoft Uighur"/>
-        <a:font script="Geor" typeface="Sylfaen"/>
       </a:minorFont>
     </a:fontScheme>
     <a:fmtScheme name="Office">
@@ -7956,7 +7959,7 @@
   <a:extraClrSchemeLst/>
   <a:extLst>
     <a:ext uri="{05A4C25C-085E-4340-85A3-A5531E510DB2}">
-      <thm15:themeFamily xmlns="" xmlns:thm15="http://schemas.microsoft.com/office/thememl/2012/main" name="Office Theme" id="{62F939B6-93AF-4DB8-9C6B-D6C7DFDC589F}" vid="{4A3C46E8-61CC-4603-A589-7422A47A8E4A}"/>
+      <thm15:themeFamily xmlns:thm15="http://schemas.microsoft.com/office/thememl/2012/main" name="Office Theme" id="{62F939B6-93AF-4DB8-9C6B-D6C7DFDC589F}" vid="{4A3C46E8-61CC-4603-A589-7422A47A8E4A}"/>
     </a:ext>
   </a:extLst>
 </a:theme>

</xml_diff>